<commit_message>
Bash, adding referencing script arguments.
</commit_message>
<xml_diff>
--- a/15.BashScripting/15-Bash_Scripting.pptx
+++ b/15.BashScripting/15-Bash_Scripting.pptx
@@ -5,7 +5,7 @@
     <p:sldMasterId id="2147483648" r:id="rId1"/>
   </p:sldMasterIdLst>
   <p:notesMasterIdLst>
-    <p:notesMasterId r:id="rId10"/>
+    <p:notesMasterId r:id="rId11"/>
   </p:notesMasterIdLst>
   <p:sldIdLst>
     <p:sldId id="285" r:id="rId2"/>
@@ -16,6 +16,7 @@
     <p:sldId id="298" r:id="rId7"/>
     <p:sldId id="299" r:id="rId8"/>
     <p:sldId id="300" r:id="rId9"/>
+    <p:sldId id="301" r:id="rId10"/>
   </p:sldIdLst>
   <p:sldSz cx="9144000" cy="6858000" type="screen4x3"/>
   <p:notesSz cx="6858000" cy="9144000"/>
@@ -223,7 +224,7 @@
           <a:p>
             <a:fld id="{75861919-8521-4274-BB91-998CD62CEE44}" type="datetimeFigureOut">
               <a:rPr lang="en-US" smtClean="0"/>
-              <a:t>4/6/17</a:t>
+              <a:t>4/7/17</a:t>
             </a:fld>
             <a:endParaRPr lang="en-US"/>
           </a:p>
@@ -924,7 +925,7 @@
           <a:p>
             <a:fld id="{3EA744D9-3FBE-48D8-BF2A-85DF203E4D20}" type="datetimeFigureOut">
               <a:rPr lang="bg-BG" smtClean="0"/>
-              <a:t>6.04.17 г.</a:t>
+              <a:t>7.04.17 г.</a:t>
             </a:fld>
             <a:endParaRPr lang="bg-BG"/>
           </a:p>
@@ -1094,7 +1095,7 @@
           <a:p>
             <a:fld id="{3EA744D9-3FBE-48D8-BF2A-85DF203E4D20}" type="datetimeFigureOut">
               <a:rPr lang="bg-BG" smtClean="0"/>
-              <a:t>6.04.17 г.</a:t>
+              <a:t>7.04.17 г.</a:t>
             </a:fld>
             <a:endParaRPr lang="bg-BG"/>
           </a:p>
@@ -1274,7 +1275,7 @@
           <a:p>
             <a:fld id="{3EA744D9-3FBE-48D8-BF2A-85DF203E4D20}" type="datetimeFigureOut">
               <a:rPr lang="bg-BG" smtClean="0"/>
-              <a:t>6.04.17 г.</a:t>
+              <a:t>7.04.17 г.</a:t>
             </a:fld>
             <a:endParaRPr lang="bg-BG"/>
           </a:p>
@@ -1444,7 +1445,7 @@
           <a:p>
             <a:fld id="{3EA744D9-3FBE-48D8-BF2A-85DF203E4D20}" type="datetimeFigureOut">
               <a:rPr lang="bg-BG" smtClean="0"/>
-              <a:t>6.04.17 г.</a:t>
+              <a:t>7.04.17 г.</a:t>
             </a:fld>
             <a:endParaRPr lang="bg-BG"/>
           </a:p>
@@ -1690,7 +1691,7 @@
           <a:p>
             <a:fld id="{3EA744D9-3FBE-48D8-BF2A-85DF203E4D20}" type="datetimeFigureOut">
               <a:rPr lang="bg-BG" smtClean="0"/>
-              <a:t>6.04.17 г.</a:t>
+              <a:t>7.04.17 г.</a:t>
             </a:fld>
             <a:endParaRPr lang="bg-BG"/>
           </a:p>
@@ -1978,7 +1979,7 @@
           <a:p>
             <a:fld id="{3EA744D9-3FBE-48D8-BF2A-85DF203E4D20}" type="datetimeFigureOut">
               <a:rPr lang="bg-BG" smtClean="0"/>
-              <a:t>6.04.17 г.</a:t>
+              <a:t>7.04.17 г.</a:t>
             </a:fld>
             <a:endParaRPr lang="bg-BG"/>
           </a:p>
@@ -2400,7 +2401,7 @@
           <a:p>
             <a:fld id="{3EA744D9-3FBE-48D8-BF2A-85DF203E4D20}" type="datetimeFigureOut">
               <a:rPr lang="bg-BG" smtClean="0"/>
-              <a:t>6.04.17 г.</a:t>
+              <a:t>7.04.17 г.</a:t>
             </a:fld>
             <a:endParaRPr lang="bg-BG"/>
           </a:p>
@@ -2518,7 +2519,7 @@
           <a:p>
             <a:fld id="{3EA744D9-3FBE-48D8-BF2A-85DF203E4D20}" type="datetimeFigureOut">
               <a:rPr lang="bg-BG" smtClean="0"/>
-              <a:t>6.04.17 г.</a:t>
+              <a:t>7.04.17 г.</a:t>
             </a:fld>
             <a:endParaRPr lang="bg-BG"/>
           </a:p>
@@ -2613,7 +2614,7 @@
           <a:p>
             <a:fld id="{3EA744D9-3FBE-48D8-BF2A-85DF203E4D20}" type="datetimeFigureOut">
               <a:rPr lang="bg-BG" smtClean="0"/>
-              <a:t>6.04.17 г.</a:t>
+              <a:t>7.04.17 г.</a:t>
             </a:fld>
             <a:endParaRPr lang="bg-BG"/>
           </a:p>
@@ -2890,7 +2891,7 @@
           <a:p>
             <a:fld id="{3EA744D9-3FBE-48D8-BF2A-85DF203E4D20}" type="datetimeFigureOut">
               <a:rPr lang="bg-BG" smtClean="0"/>
-              <a:t>6.04.17 г.</a:t>
+              <a:t>7.04.17 г.</a:t>
             </a:fld>
             <a:endParaRPr lang="bg-BG"/>
           </a:p>
@@ -3143,7 +3144,7 @@
           <a:p>
             <a:fld id="{3EA744D9-3FBE-48D8-BF2A-85DF203E4D20}" type="datetimeFigureOut">
               <a:rPr lang="bg-BG" smtClean="0"/>
-              <a:t>6.04.17 г.</a:t>
+              <a:t>7.04.17 г.</a:t>
             </a:fld>
             <a:endParaRPr lang="bg-BG"/>
           </a:p>
@@ -3365,7 +3366,7 @@
           <a:p>
             <a:fld id="{3EA744D9-3FBE-48D8-BF2A-85DF203E4D20}" type="datetimeFigureOut">
               <a:rPr lang="bg-BG" smtClean="0"/>
-              <a:t>6.04.17 г.</a:t>
+              <a:t>7.04.17 г.</a:t>
             </a:fld>
             <a:endParaRPr lang="bg-BG"/>
           </a:p>
@@ -8304,6 +8305,559 @@
     <p:extLst>
       <p:ext uri="{BB962C8B-B14F-4D97-AF65-F5344CB8AC3E}">
         <p14:creationId xmlns:p14="http://schemas.microsoft.com/office/powerpoint/2010/main" val="1301948310"/>
+      </p:ext>
+    </p:extLst>
+  </p:cSld>
+  <p:clrMapOvr>
+    <a:masterClrMapping/>
+  </p:clrMapOvr>
+</p:sld>
+</file>
+
+<file path=ppt/slides/slide9.xml><?xml version="1.0" encoding="utf-8"?>
+<p:sld xmlns:a="http://schemas.openxmlformats.org/drawingml/2006/main" xmlns:r="http://schemas.openxmlformats.org/officeDocument/2006/relationships" xmlns:p="http://schemas.openxmlformats.org/presentationml/2006/main">
+  <p:cSld>
+    <p:spTree>
+      <p:nvGrpSpPr>
+        <p:cNvPr id="1" name=""/>
+        <p:cNvGrpSpPr/>
+        <p:nvPr/>
+      </p:nvGrpSpPr>
+      <p:grpSpPr>
+        <a:xfrm>
+          <a:off x="0" y="0"/>
+          <a:ext cx="0" cy="0"/>
+          <a:chOff x="0" y="0"/>
+          <a:chExt cx="0" cy="0"/>
+        </a:xfrm>
+      </p:grpSpPr>
+      <p:sp>
+        <p:nvSpPr>
+          <p:cNvPr id="2" name="Title 1"/>
+          <p:cNvSpPr>
+            <a:spLocks noGrp="1"/>
+          </p:cNvSpPr>
+          <p:nvPr>
+            <p:ph type="title"/>
+          </p:nvPr>
+        </p:nvSpPr>
+        <p:spPr/>
+        <p:txBody>
+          <a:bodyPr>
+            <a:normAutofit fontScale="90000"/>
+          </a:bodyPr>
+          <a:lstStyle/>
+          <a:p>
+            <a:r>
+              <a:rPr lang="en-US" sz="2400" dirty="0" smtClean="0">
+                <a:solidFill>
+                  <a:schemeClr val="bg2"/>
+                </a:solidFill>
+              </a:rPr>
+              <a:t/>
+            </a:r>
+            <a:br>
+              <a:rPr lang="en-US" sz="2400" dirty="0" smtClean="0">
+                <a:solidFill>
+                  <a:schemeClr val="bg2"/>
+                </a:solidFill>
+              </a:rPr>
+            </a:br>
+            <a:r>
+              <a:rPr lang="en-US" sz="2400" dirty="0">
+                <a:solidFill>
+                  <a:schemeClr val="bg2"/>
+                </a:solidFill>
+              </a:rPr>
+              <a:t/>
+            </a:r>
+            <a:br>
+              <a:rPr lang="en-US" sz="2400" dirty="0">
+                <a:solidFill>
+                  <a:schemeClr val="bg2"/>
+                </a:solidFill>
+              </a:rPr>
+            </a:br>
+            <a:r>
+              <a:rPr lang="en-US" sz="2400" dirty="0" smtClean="0">
+                <a:solidFill>
+                  <a:schemeClr val="bg2"/>
+                </a:solidFill>
+              </a:rPr>
+              <a:t/>
+            </a:r>
+            <a:br>
+              <a:rPr lang="en-US" sz="2400" dirty="0" smtClean="0">
+                <a:solidFill>
+                  <a:schemeClr val="bg2"/>
+                </a:solidFill>
+              </a:rPr>
+            </a:br>
+            <a:r>
+              <a:rPr lang="en-US" sz="2400" dirty="0">
+                <a:solidFill>
+                  <a:schemeClr val="bg2"/>
+                </a:solidFill>
+              </a:rPr>
+              <a:t/>
+            </a:r>
+            <a:br>
+              <a:rPr lang="en-US" sz="2400" dirty="0">
+                <a:solidFill>
+                  <a:schemeClr val="bg2"/>
+                </a:solidFill>
+              </a:rPr>
+            </a:br>
+            <a:r>
+              <a:rPr lang="en-US" sz="2400" dirty="0" smtClean="0">
+                <a:solidFill>
+                  <a:schemeClr val="bg2"/>
+                </a:solidFill>
+              </a:rPr>
+              <a:t/>
+            </a:r>
+            <a:br>
+              <a:rPr lang="en-US" sz="2400" dirty="0" smtClean="0">
+                <a:solidFill>
+                  <a:schemeClr val="bg2"/>
+                </a:solidFill>
+              </a:rPr>
+            </a:br>
+            <a:r>
+              <a:rPr lang="en-US" sz="2400" dirty="0">
+                <a:solidFill>
+                  <a:schemeClr val="bg2"/>
+                </a:solidFill>
+              </a:rPr>
+              <a:t/>
+            </a:r>
+            <a:br>
+              <a:rPr lang="en-US" sz="2400" dirty="0">
+                <a:solidFill>
+                  <a:schemeClr val="bg2"/>
+                </a:solidFill>
+              </a:rPr>
+            </a:br>
+            <a:r>
+              <a:rPr lang="en-US" sz="2400" dirty="0" smtClean="0">
+                <a:solidFill>
+                  <a:schemeClr val="bg2"/>
+                </a:solidFill>
+              </a:rPr>
+              <a:t/>
+            </a:r>
+            <a:br>
+              <a:rPr lang="en-US" sz="2400" dirty="0" smtClean="0">
+                <a:solidFill>
+                  <a:schemeClr val="bg2"/>
+                </a:solidFill>
+              </a:rPr>
+            </a:br>
+            <a:r>
+              <a:rPr lang="en-US" sz="2400" dirty="0" smtClean="0">
+                <a:solidFill>
+                  <a:schemeClr val="bg2"/>
+                </a:solidFill>
+              </a:rPr>
+              <a:t/>
+            </a:r>
+            <a:br>
+              <a:rPr lang="en-US" sz="2400" dirty="0" smtClean="0">
+                <a:solidFill>
+                  <a:schemeClr val="bg2"/>
+                </a:solidFill>
+              </a:rPr>
+            </a:br>
+            <a:r>
+              <a:rPr lang="en-US" sz="2400" dirty="0">
+                <a:solidFill>
+                  <a:schemeClr val="bg2"/>
+                </a:solidFill>
+              </a:rPr>
+              <a:t/>
+            </a:r>
+            <a:br>
+              <a:rPr lang="en-US" sz="2400" dirty="0">
+                <a:solidFill>
+                  <a:schemeClr val="bg2"/>
+                </a:solidFill>
+              </a:rPr>
+            </a:br>
+            <a:r>
+              <a:rPr lang="en-US" sz="2400" dirty="0" smtClean="0">
+                <a:solidFill>
+                  <a:schemeClr val="bg2"/>
+                </a:solidFill>
+              </a:rPr>
+              <a:t/>
+            </a:r>
+            <a:br>
+              <a:rPr lang="en-US" sz="2400" dirty="0" smtClean="0">
+                <a:solidFill>
+                  <a:schemeClr val="bg2"/>
+                </a:solidFill>
+              </a:rPr>
+            </a:br>
+            <a:r>
+              <a:rPr lang="en-US" sz="2400" dirty="0">
+                <a:solidFill>
+                  <a:schemeClr val="bg2"/>
+                </a:solidFill>
+              </a:rPr>
+              <a:t/>
+            </a:r>
+            <a:br>
+              <a:rPr lang="en-US" sz="2400" dirty="0">
+                <a:solidFill>
+                  <a:schemeClr val="bg2"/>
+                </a:solidFill>
+              </a:rPr>
+            </a:br>
+            <a:r>
+              <a:rPr lang="en-US" sz="2400" dirty="0" smtClean="0">
+                <a:solidFill>
+                  <a:schemeClr val="bg2"/>
+                </a:solidFill>
+              </a:rPr>
+              <a:t/>
+            </a:r>
+            <a:br>
+              <a:rPr lang="en-US" sz="2400" dirty="0" smtClean="0">
+                <a:solidFill>
+                  <a:schemeClr val="bg2"/>
+                </a:solidFill>
+              </a:rPr>
+            </a:br>
+            <a:r>
+              <a:rPr lang="en-US" sz="2400" dirty="0" smtClean="0">
+                <a:solidFill>
+                  <a:schemeClr val="bg2"/>
+                </a:solidFill>
+              </a:rPr>
+              <a:t/>
+            </a:r>
+            <a:br>
+              <a:rPr lang="en-US" sz="2400" dirty="0" smtClean="0">
+                <a:solidFill>
+                  <a:schemeClr val="bg2"/>
+                </a:solidFill>
+              </a:rPr>
+            </a:br>
+            <a:r>
+              <a:rPr lang="en-US" sz="2400" dirty="0">
+                <a:solidFill>
+                  <a:schemeClr val="accent6"/>
+                </a:solidFill>
+              </a:rPr>
+              <a:t/>
+            </a:r>
+            <a:br>
+              <a:rPr lang="en-US" sz="2400" dirty="0">
+                <a:solidFill>
+                  <a:schemeClr val="accent6"/>
+                </a:solidFill>
+              </a:rPr>
+            </a:br>
+            <a:r>
+              <a:rPr lang="en-US" sz="2400" dirty="0" smtClean="0">
+                <a:solidFill>
+                  <a:schemeClr val="accent6"/>
+                </a:solidFill>
+              </a:rPr>
+              <a:t> </a:t>
+            </a:r>
+            <a:r>
+              <a:rPr lang="en-US" sz="1600" dirty="0" smtClean="0">
+                <a:solidFill>
+                  <a:schemeClr val="accent6"/>
+                </a:solidFill>
+              </a:rPr>
+              <a:t>Positional parameters are variables which store the values of command-line arguments to a script.</a:t>
+            </a:r>
+            <a:br>
+              <a:rPr lang="en-US" sz="1600" dirty="0" smtClean="0">
+                <a:solidFill>
+                  <a:schemeClr val="accent6"/>
+                </a:solidFill>
+              </a:rPr>
+            </a:br>
+            <a:r>
+              <a:rPr lang="en-US" sz="1600" dirty="0" smtClean="0">
+                <a:solidFill>
+                  <a:schemeClr val="accent6"/>
+                </a:solidFill>
+              </a:rPr>
+              <a:t>0 =&gt; refers to the script name itself</a:t>
+            </a:r>
+            <a:br>
+              <a:rPr lang="en-US" sz="1600" dirty="0" smtClean="0">
+                <a:solidFill>
+                  <a:schemeClr val="accent6"/>
+                </a:solidFill>
+              </a:rPr>
+            </a:br>
+            <a:r>
+              <a:rPr lang="en-US" sz="1600" dirty="0" smtClean="0">
+                <a:solidFill>
+                  <a:schemeClr val="accent6"/>
+                </a:solidFill>
+              </a:rPr>
+              <a:t>1 =&gt; the first argument to the script</a:t>
+            </a:r>
+            <a:br>
+              <a:rPr lang="en-US" sz="1600" dirty="0" smtClean="0">
+                <a:solidFill>
+                  <a:schemeClr val="accent6"/>
+                </a:solidFill>
+              </a:rPr>
+            </a:br>
+            <a:r>
+              <a:rPr lang="en-US" sz="1600" dirty="0">
+                <a:solidFill>
+                  <a:schemeClr val="bg2"/>
+                </a:solidFill>
+              </a:rPr>
+              <a:t/>
+            </a:r>
+            <a:br>
+              <a:rPr lang="en-US" sz="1600" dirty="0">
+                <a:solidFill>
+                  <a:schemeClr val="bg2"/>
+                </a:solidFill>
+              </a:rPr>
+            </a:br>
+            <a:r>
+              <a:rPr lang="en-US" sz="1600" dirty="0" smtClean="0">
+                <a:solidFill>
+                  <a:srgbClr val="FF0000"/>
+                </a:solidFill>
+              </a:rPr>
+              <a:t>Exercises:</a:t>
+            </a:r>
+            <a:r>
+              <a:rPr lang="en-US" sz="1600" dirty="0" smtClean="0">
+                <a:solidFill>
+                  <a:schemeClr val="bg2"/>
+                </a:solidFill>
+              </a:rPr>
+              <a:t/>
+            </a:r>
+            <a:br>
+              <a:rPr lang="en-US" sz="1600" dirty="0" smtClean="0">
+                <a:solidFill>
+                  <a:schemeClr val="bg2"/>
+                </a:solidFill>
+              </a:rPr>
+            </a:br>
+            <a:r>
+              <a:rPr lang="en-US" sz="1600" dirty="0" smtClean="0">
+                <a:solidFill>
+                  <a:schemeClr val="bg2"/>
+                </a:solidFill>
+              </a:rPr>
+              <a:t>1. Write a bash script that prints its name and its first parameter, do not forget provide it.</a:t>
+            </a:r>
+            <a:r>
+              <a:rPr lang="en-US" sz="1600" dirty="0">
+                <a:solidFill>
+                  <a:schemeClr val="bg2"/>
+                </a:solidFill>
+              </a:rPr>
+              <a:t/>
+            </a:r>
+            <a:br>
+              <a:rPr lang="en-US" sz="1600" dirty="0">
+                <a:solidFill>
+                  <a:schemeClr val="bg2"/>
+                </a:solidFill>
+              </a:rPr>
+            </a:br>
+            <a:r>
+              <a:rPr lang="en-US" sz="1600" dirty="0" smtClean="0">
+                <a:solidFill>
+                  <a:schemeClr val="bg2"/>
+                </a:solidFill>
+              </a:rPr>
+              <a:t/>
+            </a:r>
+            <a:br>
+              <a:rPr lang="en-US" sz="1600" dirty="0" smtClean="0">
+                <a:solidFill>
+                  <a:schemeClr val="bg2"/>
+                </a:solidFill>
+              </a:rPr>
+            </a:br>
+            <a:r>
+              <a:rPr lang="en-US" sz="1600" dirty="0" smtClean="0">
+                <a:solidFill>
+                  <a:schemeClr val="accent6"/>
+                </a:solidFill>
+              </a:rPr>
+              <a:t>$* and $@ refer to all arguments in a script, but in a different way.</a:t>
+            </a:r>
+            <a:br>
+              <a:rPr lang="en-US" sz="1600" dirty="0" smtClean="0">
+                <a:solidFill>
+                  <a:schemeClr val="accent6"/>
+                </a:solidFill>
+              </a:rPr>
+            </a:br>
+            <a:r>
+              <a:rPr lang="en-US" sz="1600" dirty="0">
+                <a:solidFill>
+                  <a:schemeClr val="bg2"/>
+                </a:solidFill>
+              </a:rPr>
+              <a:t/>
+            </a:r>
+            <a:br>
+              <a:rPr lang="en-US" sz="1600" dirty="0">
+                <a:solidFill>
+                  <a:schemeClr val="bg2"/>
+                </a:solidFill>
+              </a:rPr>
+            </a:br>
+            <a:r>
+              <a:rPr lang="en-US" sz="1600" dirty="0" smtClean="0">
+                <a:solidFill>
+                  <a:srgbClr val="FF0000"/>
+                </a:solidFill>
+              </a:rPr>
+              <a:t>Exercises:</a:t>
+            </a:r>
+            <a:r>
+              <a:rPr lang="en-US" sz="1600" dirty="0" smtClean="0">
+                <a:solidFill>
+                  <a:schemeClr val="bg2"/>
+                </a:solidFill>
+              </a:rPr>
+              <a:t/>
+            </a:r>
+            <a:br>
+              <a:rPr lang="en-US" sz="1600" dirty="0" smtClean="0">
+                <a:solidFill>
+                  <a:schemeClr val="bg2"/>
+                </a:solidFill>
+              </a:rPr>
+            </a:br>
+            <a:r>
+              <a:rPr lang="en-US" sz="1600" dirty="0" smtClean="0">
+                <a:solidFill>
+                  <a:schemeClr val="bg2"/>
+                </a:solidFill>
+              </a:rPr>
+              <a:t>.</a:t>
+            </a:r>
+            <a:br>
+              <a:rPr lang="en-US" sz="1600" dirty="0" smtClean="0">
+                <a:solidFill>
+                  <a:schemeClr val="bg2"/>
+                </a:solidFill>
+              </a:rPr>
+            </a:br>
+            <a:r>
+              <a:rPr lang="en-US" sz="1600" dirty="0" smtClean="0">
+                <a:solidFill>
+                  <a:schemeClr val="bg2"/>
+                </a:solidFill>
+              </a:rPr>
+              <a:t> </a:t>
+            </a:r>
+            <a:r>
+              <a:rPr lang="en-US" sz="1600" dirty="0">
+                <a:solidFill>
+                  <a:schemeClr val="bg2"/>
+                </a:solidFill>
+              </a:rPr>
+              <a:t>1. Copy and run the below script and explain the </a:t>
+            </a:r>
+            <a:r>
+              <a:rPr lang="en-US" sz="1600" dirty="0" smtClean="0">
+                <a:solidFill>
+                  <a:schemeClr val="bg2"/>
+                </a:solidFill>
+              </a:rPr>
+              <a:t>difference</a:t>
+            </a:r>
+            <a:br>
+              <a:rPr lang="en-US" sz="1600" dirty="0" smtClean="0">
+                <a:solidFill>
+                  <a:schemeClr val="bg2"/>
+                </a:solidFill>
+              </a:rPr>
+            </a:br>
+            <a:r>
+              <a:rPr lang="en-US" sz="2400" dirty="0">
+                <a:solidFill>
+                  <a:schemeClr val="bg2"/>
+                </a:solidFill>
+              </a:rPr>
+              <a:t/>
+            </a:r>
+            <a:br>
+              <a:rPr lang="en-US" sz="2400" dirty="0">
+                <a:solidFill>
+                  <a:schemeClr val="bg2"/>
+                </a:solidFill>
+              </a:rPr>
+            </a:br>
+            <a:r>
+              <a:rPr lang="en-US" sz="2400" dirty="0" smtClean="0">
+                <a:solidFill>
+                  <a:schemeClr val="bg2"/>
+                </a:solidFill>
+              </a:rPr>
+              <a:t/>
+            </a:r>
+            <a:br>
+              <a:rPr lang="en-US" sz="2400" dirty="0" smtClean="0">
+                <a:solidFill>
+                  <a:schemeClr val="bg2"/>
+                </a:solidFill>
+              </a:rPr>
+            </a:br>
+            <a:endParaRPr lang="en-US" sz="2400" dirty="0">
+              <a:solidFill>
+                <a:schemeClr val="accent6"/>
+              </a:solidFill>
+            </a:endParaRPr>
+          </a:p>
+        </p:txBody>
+      </p:sp>
+      <p:pic>
+        <p:nvPicPr>
+          <p:cNvPr id="4" name="Picture 3"/>
+          <p:cNvPicPr>
+            <a:picLocks noChangeAspect="1"/>
+          </p:cNvPicPr>
+          <p:nvPr/>
+        </p:nvPicPr>
+        <p:blipFill>
+          <a:blip r:embed="rId2">
+            <a:extLst>
+              <a:ext uri="{28A0092B-C50C-407E-A947-70E740481C1C}">
+                <a14:useLocalDpi xmlns:a14="http://schemas.microsoft.com/office/drawing/2010/main" val="0"/>
+              </a:ext>
+            </a:extLst>
+          </a:blip>
+          <a:stretch>
+            <a:fillRect/>
+          </a:stretch>
+        </p:blipFill>
+        <p:spPr>
+          <a:xfrm>
+            <a:off x="2133600" y="4114800"/>
+            <a:ext cx="4648200" cy="2667000"/>
+          </a:xfrm>
+          <a:prstGeom prst="rect">
+            <a:avLst/>
+          </a:prstGeom>
+        </p:spPr>
+      </p:pic>
+    </p:spTree>
+    <p:extLst>
+      <p:ext uri="{BB962C8B-B14F-4D97-AF65-F5344CB8AC3E}">
+        <p14:creationId xmlns:p14="http://schemas.microsoft.com/office/powerpoint/2010/main" val="2016834916"/>
       </p:ext>
     </p:extLst>
   </p:cSld>

</xml_diff>

<commit_message>
Bash scripting, comparison operators and functions.
</commit_message>
<xml_diff>
--- a/15.BashScripting/15-Bash_Scripting.pptx
+++ b/15.BashScripting/15-Bash_Scripting.pptx
@@ -5,7 +5,7 @@
     <p:sldMasterId id="2147483648" r:id="rId1"/>
   </p:sldMasterIdLst>
   <p:notesMasterIdLst>
-    <p:notesMasterId r:id="rId11"/>
+    <p:notesMasterId r:id="rId15"/>
   </p:notesMasterIdLst>
   <p:sldIdLst>
     <p:sldId id="285" r:id="rId2"/>
@@ -17,6 +17,10 @@
     <p:sldId id="299" r:id="rId8"/>
     <p:sldId id="300" r:id="rId9"/>
     <p:sldId id="301" r:id="rId10"/>
+    <p:sldId id="302" r:id="rId11"/>
+    <p:sldId id="303" r:id="rId12"/>
+    <p:sldId id="304" r:id="rId13"/>
+    <p:sldId id="305" r:id="rId14"/>
   </p:sldIdLst>
   <p:sldSz cx="9144000" cy="6858000" type="screen4x3"/>
   <p:notesSz cx="6858000" cy="9144000"/>
@@ -4034,15 +4038,39 @@
                   <a:schemeClr val="accent6"/>
                 </a:solidFill>
               </a:rPr>
-              <a:t>Bash shell scripts are a good choice for tasks which can be accomplished mainly by calling other command-line utilities. If the task involves heavy data processing and manipulation, other languages such as Perl/Python will be better suited for the job.</a:t>
-            </a:r>
-            <a:br>
+              <a:t>Bash shell scripts are a good choice for tasks which can be accomplished mainly by calling other command-line utilities. If </a:t>
+            </a:r>
+            <a:r>
               <a:rPr lang="en-US" sz="2000" dirty="0" smtClean="0">
                 <a:solidFill>
                   <a:schemeClr val="accent6"/>
                 </a:solidFill>
               </a:rPr>
-            </a:br>
+              <a:t>suited </a:t>
+            </a:r>
+            <a:r>
+              <a:rPr lang="en-US" sz="2000" dirty="0" smtClean="0">
+                <a:solidFill>
+                  <a:schemeClr val="accent6"/>
+                </a:solidFill>
+              </a:rPr>
+              <a:t>for the job.</a:t>
+            </a:r>
+            <a:br>
+              <a:rPr lang="en-US" sz="2000" dirty="0" smtClean="0">
+                <a:solidFill>
+                  <a:schemeClr val="accent6"/>
+                </a:solidFill>
+              </a:rPr>
+            </a:br>
+            <a:r>
+              <a:rPr lang="en-US" sz="2000" dirty="0">
+                <a:solidFill>
+                  <a:schemeClr val="accent6"/>
+                </a:solidFill>
+              </a:rPr>
+              <a:t>the task involves heavy data processing and manipulation, other languages such as Perl/Python will be better </a:t>
+            </a:r>
             <a:r>
               <a:rPr lang="en-US" sz="2000" dirty="0">
                 <a:solidFill>
@@ -4154,6 +4182,2074 @@
     <p:extLst>
       <p:ext uri="{BB962C8B-B14F-4D97-AF65-F5344CB8AC3E}">
         <p14:creationId xmlns:p14="http://schemas.microsoft.com/office/powerpoint/2010/main" val="1715592112"/>
+      </p:ext>
+    </p:extLst>
+  </p:cSld>
+  <p:clrMapOvr>
+    <a:masterClrMapping/>
+  </p:clrMapOvr>
+</p:sld>
+</file>
+
+<file path=ppt/slides/slide10.xml><?xml version="1.0" encoding="utf-8"?>
+<p:sld xmlns:a="http://schemas.openxmlformats.org/drawingml/2006/main" xmlns:r="http://schemas.openxmlformats.org/officeDocument/2006/relationships" xmlns:p="http://schemas.openxmlformats.org/presentationml/2006/main">
+  <p:cSld>
+    <p:spTree>
+      <p:nvGrpSpPr>
+        <p:cNvPr id="1" name=""/>
+        <p:cNvGrpSpPr/>
+        <p:nvPr/>
+      </p:nvGrpSpPr>
+      <p:grpSpPr>
+        <a:xfrm>
+          <a:off x="0" y="0"/>
+          <a:ext cx="0" cy="0"/>
+          <a:chOff x="0" y="0"/>
+          <a:chExt cx="0" cy="0"/>
+        </a:xfrm>
+      </p:grpSpPr>
+      <p:sp>
+        <p:nvSpPr>
+          <p:cNvPr id="2" name="Title 1"/>
+          <p:cNvSpPr>
+            <a:spLocks noGrp="1"/>
+          </p:cNvSpPr>
+          <p:nvPr>
+            <p:ph type="title"/>
+          </p:nvPr>
+        </p:nvSpPr>
+        <p:spPr/>
+        <p:txBody>
+          <a:bodyPr>
+            <a:normAutofit fontScale="90000"/>
+          </a:bodyPr>
+          <a:lstStyle/>
+          <a:p>
+            <a:r>
+              <a:rPr lang="en-US" sz="2400" dirty="0" smtClean="0">
+                <a:solidFill>
+                  <a:schemeClr val="bg2"/>
+                </a:solidFill>
+              </a:rPr>
+              <a:t/>
+            </a:r>
+            <a:br>
+              <a:rPr lang="en-US" sz="2400" dirty="0" smtClean="0">
+                <a:solidFill>
+                  <a:schemeClr val="bg2"/>
+                </a:solidFill>
+              </a:rPr>
+            </a:br>
+            <a:r>
+              <a:rPr lang="en-US" sz="2400" dirty="0">
+                <a:solidFill>
+                  <a:schemeClr val="bg2"/>
+                </a:solidFill>
+              </a:rPr>
+              <a:t/>
+            </a:r>
+            <a:br>
+              <a:rPr lang="en-US" sz="2400" dirty="0">
+                <a:solidFill>
+                  <a:schemeClr val="bg2"/>
+                </a:solidFill>
+              </a:rPr>
+            </a:br>
+            <a:r>
+              <a:rPr lang="en-US" sz="2400" dirty="0" smtClean="0">
+                <a:solidFill>
+                  <a:schemeClr val="bg2"/>
+                </a:solidFill>
+              </a:rPr>
+              <a:t/>
+            </a:r>
+            <a:br>
+              <a:rPr lang="en-US" sz="2400" dirty="0" smtClean="0">
+                <a:solidFill>
+                  <a:schemeClr val="bg2"/>
+                </a:solidFill>
+              </a:rPr>
+            </a:br>
+            <a:r>
+              <a:rPr lang="en-US" sz="2400" dirty="0">
+                <a:solidFill>
+                  <a:schemeClr val="bg2"/>
+                </a:solidFill>
+              </a:rPr>
+              <a:t/>
+            </a:r>
+            <a:br>
+              <a:rPr lang="en-US" sz="2400" dirty="0">
+                <a:solidFill>
+                  <a:schemeClr val="bg2"/>
+                </a:solidFill>
+              </a:rPr>
+            </a:br>
+            <a:r>
+              <a:rPr lang="en-US" sz="2400" dirty="0" smtClean="0">
+                <a:solidFill>
+                  <a:schemeClr val="bg2"/>
+                </a:solidFill>
+              </a:rPr>
+              <a:t/>
+            </a:r>
+            <a:br>
+              <a:rPr lang="en-US" sz="2400" dirty="0" smtClean="0">
+                <a:solidFill>
+                  <a:schemeClr val="bg2"/>
+                </a:solidFill>
+              </a:rPr>
+            </a:br>
+            <a:r>
+              <a:rPr lang="en-US" sz="2400" dirty="0">
+                <a:solidFill>
+                  <a:schemeClr val="bg2"/>
+                </a:solidFill>
+              </a:rPr>
+              <a:t/>
+            </a:r>
+            <a:br>
+              <a:rPr lang="en-US" sz="2400" dirty="0">
+                <a:solidFill>
+                  <a:schemeClr val="bg2"/>
+                </a:solidFill>
+              </a:rPr>
+            </a:br>
+            <a:r>
+              <a:rPr lang="en-US" sz="2400" dirty="0" smtClean="0">
+                <a:solidFill>
+                  <a:schemeClr val="bg2"/>
+                </a:solidFill>
+              </a:rPr>
+              <a:t/>
+            </a:r>
+            <a:br>
+              <a:rPr lang="en-US" sz="2400" dirty="0" smtClean="0">
+                <a:solidFill>
+                  <a:schemeClr val="bg2"/>
+                </a:solidFill>
+              </a:rPr>
+            </a:br>
+            <a:r>
+              <a:rPr lang="en-US" sz="2400" dirty="0" smtClean="0">
+                <a:solidFill>
+                  <a:schemeClr val="bg2"/>
+                </a:solidFill>
+              </a:rPr>
+              <a:t/>
+            </a:r>
+            <a:br>
+              <a:rPr lang="en-US" sz="2400" dirty="0" smtClean="0">
+                <a:solidFill>
+                  <a:schemeClr val="bg2"/>
+                </a:solidFill>
+              </a:rPr>
+            </a:br>
+            <a:r>
+              <a:rPr lang="en-US" sz="2400" dirty="0">
+                <a:solidFill>
+                  <a:schemeClr val="bg2"/>
+                </a:solidFill>
+              </a:rPr>
+              <a:t/>
+            </a:r>
+            <a:br>
+              <a:rPr lang="en-US" sz="2400" dirty="0">
+                <a:solidFill>
+                  <a:schemeClr val="bg2"/>
+                </a:solidFill>
+              </a:rPr>
+            </a:br>
+            <a:r>
+              <a:rPr lang="en-US" sz="2400" dirty="0" smtClean="0">
+                <a:solidFill>
+                  <a:schemeClr val="bg2"/>
+                </a:solidFill>
+              </a:rPr>
+              <a:t/>
+            </a:r>
+            <a:br>
+              <a:rPr lang="en-US" sz="2400" dirty="0" smtClean="0">
+                <a:solidFill>
+                  <a:schemeClr val="bg2"/>
+                </a:solidFill>
+              </a:rPr>
+            </a:br>
+            <a:r>
+              <a:rPr lang="en-US" sz="2400" dirty="0">
+                <a:solidFill>
+                  <a:schemeClr val="bg2"/>
+                </a:solidFill>
+              </a:rPr>
+              <a:t/>
+            </a:r>
+            <a:br>
+              <a:rPr lang="en-US" sz="2400" dirty="0">
+                <a:solidFill>
+                  <a:schemeClr val="bg2"/>
+                </a:solidFill>
+              </a:rPr>
+            </a:br>
+            <a:r>
+              <a:rPr lang="en-US" sz="2400" dirty="0" smtClean="0">
+                <a:solidFill>
+                  <a:schemeClr val="bg2"/>
+                </a:solidFill>
+              </a:rPr>
+              <a:t/>
+            </a:r>
+            <a:br>
+              <a:rPr lang="en-US" sz="2400" dirty="0" smtClean="0">
+                <a:solidFill>
+                  <a:schemeClr val="bg2"/>
+                </a:solidFill>
+              </a:rPr>
+            </a:br>
+            <a:r>
+              <a:rPr lang="en-US" sz="2400" dirty="0" smtClean="0">
+                <a:solidFill>
+                  <a:schemeClr val="bg2"/>
+                </a:solidFill>
+              </a:rPr>
+              <a:t/>
+            </a:r>
+            <a:br>
+              <a:rPr lang="en-US" sz="2400" dirty="0" smtClean="0">
+                <a:solidFill>
+                  <a:schemeClr val="bg2"/>
+                </a:solidFill>
+              </a:rPr>
+            </a:br>
+            <a:r>
+              <a:rPr lang="en-US" sz="2400" dirty="0">
+                <a:solidFill>
+                  <a:schemeClr val="accent6"/>
+                </a:solidFill>
+              </a:rPr>
+              <a:t/>
+            </a:r>
+            <a:br>
+              <a:rPr lang="en-US" sz="2400" dirty="0">
+                <a:solidFill>
+                  <a:schemeClr val="accent6"/>
+                </a:solidFill>
+              </a:rPr>
+            </a:br>
+            <a:r>
+              <a:rPr lang="en-US" sz="2000" dirty="0" smtClean="0">
+                <a:solidFill>
+                  <a:schemeClr val="accent6"/>
+                </a:solidFill>
+              </a:rPr>
+              <a:t>Every command returns an exit status, commonly referred to as return status/exit code. A successful command exits with an exit status of  0.</a:t>
+            </a:r>
+            <a:br>
+              <a:rPr lang="en-US" sz="2000" dirty="0" smtClean="0">
+                <a:solidFill>
+                  <a:schemeClr val="accent6"/>
+                </a:solidFill>
+              </a:rPr>
+            </a:br>
+            <a:r>
+              <a:rPr lang="en-US" sz="2000" dirty="0" smtClean="0">
+                <a:solidFill>
+                  <a:schemeClr val="accent6"/>
+                </a:solidFill>
+              </a:rPr>
+              <a:t>Upon completion, a command’s exit status is passed to the parent process and stored in the ? Variable. Therefore, the exit status of an executed command can be retrieved by displaying the value of $?</a:t>
+            </a:r>
+            <a:br>
+              <a:rPr lang="en-US" sz="2000" dirty="0" smtClean="0">
+                <a:solidFill>
+                  <a:schemeClr val="accent6"/>
+                </a:solidFill>
+              </a:rPr>
+            </a:br>
+            <a:r>
+              <a:rPr lang="en-US" sz="2000" dirty="0">
+                <a:solidFill>
+                  <a:schemeClr val="bg2"/>
+                </a:solidFill>
+              </a:rPr>
+              <a:t/>
+            </a:r>
+            <a:br>
+              <a:rPr lang="en-US" sz="2000" dirty="0">
+                <a:solidFill>
+                  <a:schemeClr val="bg2"/>
+                </a:solidFill>
+              </a:rPr>
+            </a:br>
+            <a:r>
+              <a:rPr lang="en-US" sz="1600" dirty="0" smtClean="0">
+                <a:solidFill>
+                  <a:schemeClr val="bg2"/>
+                </a:solidFill>
+              </a:rPr>
+              <a:t/>
+            </a:r>
+            <a:br>
+              <a:rPr lang="en-US" sz="1600" dirty="0" smtClean="0">
+                <a:solidFill>
+                  <a:schemeClr val="bg2"/>
+                </a:solidFill>
+              </a:rPr>
+            </a:br>
+            <a:r>
+              <a:rPr lang="en-US" sz="1600" dirty="0" smtClean="0">
+                <a:solidFill>
+                  <a:schemeClr val="bg2"/>
+                </a:solidFill>
+              </a:rPr>
+              <a:t> </a:t>
+            </a:r>
+            <a:r>
+              <a:rPr lang="en-US" sz="1600" dirty="0" smtClean="0">
+                <a:solidFill>
+                  <a:srgbClr val="FF0000"/>
+                </a:solidFill>
+              </a:rPr>
+              <a:t>Exercises:</a:t>
+            </a:r>
+            <a:br>
+              <a:rPr lang="en-US" sz="1600" dirty="0" smtClean="0">
+                <a:solidFill>
+                  <a:srgbClr val="FF0000"/>
+                </a:solidFill>
+              </a:rPr>
+            </a:br>
+            <a:r>
+              <a:rPr lang="en-US" sz="1600" dirty="0" smtClean="0">
+                <a:solidFill>
+                  <a:schemeClr val="bg1"/>
+                </a:solidFill>
+              </a:rPr>
+              <a:t>1. ls /</a:t>
+            </a:r>
+            <a:r>
+              <a:rPr lang="en-US" sz="1600" dirty="0" err="1" smtClean="0">
+                <a:solidFill>
+                  <a:schemeClr val="bg1"/>
+                </a:solidFill>
+              </a:rPr>
+              <a:t>etc</a:t>
+            </a:r>
+            <a:r>
+              <a:rPr lang="en-US" sz="1600" dirty="0" smtClean="0">
+                <a:solidFill>
+                  <a:schemeClr val="bg1"/>
+                </a:solidFill>
+              </a:rPr>
+              <a:t>/hosts</a:t>
+            </a:r>
+            <a:br>
+              <a:rPr lang="en-US" sz="1600" dirty="0" smtClean="0">
+                <a:solidFill>
+                  <a:schemeClr val="bg1"/>
+                </a:solidFill>
+              </a:rPr>
+            </a:br>
+            <a:r>
+              <a:rPr lang="en-US" sz="1600" dirty="0" smtClean="0">
+                <a:solidFill>
+                  <a:schemeClr val="bg1"/>
+                </a:solidFill>
+              </a:rPr>
+              <a:t>2. echo $?</a:t>
+            </a:r>
+            <a:br>
+              <a:rPr lang="en-US" sz="1600" dirty="0" smtClean="0">
+                <a:solidFill>
+                  <a:schemeClr val="bg1"/>
+                </a:solidFill>
+              </a:rPr>
+            </a:br>
+            <a:r>
+              <a:rPr lang="en-US" sz="1600" dirty="0" smtClean="0">
+                <a:solidFill>
+                  <a:schemeClr val="bg1"/>
+                </a:solidFill>
+              </a:rPr>
+              <a:t>3. ls /</a:t>
+            </a:r>
+            <a:r>
+              <a:rPr lang="en-US" sz="1600" dirty="0" err="1" smtClean="0">
+                <a:solidFill>
+                  <a:schemeClr val="bg1"/>
+                </a:solidFill>
+              </a:rPr>
+              <a:t>etc</a:t>
+            </a:r>
+            <a:r>
+              <a:rPr lang="en-US" sz="1600" dirty="0" smtClean="0">
+                <a:solidFill>
+                  <a:schemeClr val="bg1"/>
+                </a:solidFill>
+              </a:rPr>
+              <a:t>/</a:t>
+            </a:r>
+            <a:r>
+              <a:rPr lang="en-US" sz="1600" dirty="0" err="1" smtClean="0">
+                <a:solidFill>
+                  <a:schemeClr val="bg1"/>
+                </a:solidFill>
+              </a:rPr>
+              <a:t>nofile</a:t>
+            </a:r>
+            <a:r>
+              <a:rPr lang="en-US" sz="1600" dirty="0" smtClean="0">
+                <a:solidFill>
+                  <a:schemeClr val="bg1"/>
+                </a:solidFill>
+              </a:rPr>
+              <a:t/>
+            </a:r>
+            <a:br>
+              <a:rPr lang="en-US" sz="1600" dirty="0" smtClean="0">
+                <a:solidFill>
+                  <a:schemeClr val="bg1"/>
+                </a:solidFill>
+              </a:rPr>
+            </a:br>
+            <a:r>
+              <a:rPr lang="en-US" sz="1600" dirty="0" smtClean="0">
+                <a:solidFill>
+                  <a:schemeClr val="bg1"/>
+                </a:solidFill>
+              </a:rPr>
+              <a:t>4. echo$?</a:t>
+            </a:r>
+            <a:br>
+              <a:rPr lang="en-US" sz="1600" dirty="0" smtClean="0">
+                <a:solidFill>
+                  <a:schemeClr val="bg1"/>
+                </a:solidFill>
+              </a:rPr>
+            </a:br>
+            <a:r>
+              <a:rPr lang="en-US" sz="1600" dirty="0">
+                <a:solidFill>
+                  <a:schemeClr val="bg1"/>
+                </a:solidFill>
+              </a:rPr>
+              <a:t/>
+            </a:r>
+            <a:br>
+              <a:rPr lang="en-US" sz="1600" dirty="0">
+                <a:solidFill>
+                  <a:schemeClr val="bg1"/>
+                </a:solidFill>
+              </a:rPr>
+            </a:br>
+            <a:r>
+              <a:rPr lang="en-US" sz="2000" dirty="0" smtClean="0">
+                <a:solidFill>
+                  <a:schemeClr val="accent6"/>
+                </a:solidFill>
+              </a:rPr>
+              <a:t>The</a:t>
+            </a:r>
+            <a:r>
+              <a:rPr lang="en-US" sz="1600" dirty="0" smtClean="0">
+                <a:solidFill>
+                  <a:schemeClr val="accent6"/>
+                </a:solidFill>
+              </a:rPr>
+              <a:t> ’</a:t>
+            </a:r>
+            <a:r>
+              <a:rPr lang="en-US" sz="1600" dirty="0" smtClean="0">
+                <a:solidFill>
+                  <a:schemeClr val="bg1"/>
+                </a:solidFill>
+              </a:rPr>
+              <a:t>exit</a:t>
+            </a:r>
+            <a:r>
+              <a:rPr lang="en-US" sz="1600" dirty="0" smtClean="0">
+                <a:solidFill>
+                  <a:schemeClr val="accent6"/>
+                </a:solidFill>
+              </a:rPr>
+              <a:t>’ </a:t>
+            </a:r>
+            <a:r>
+              <a:rPr lang="en-US" sz="2000" dirty="0" smtClean="0">
+                <a:solidFill>
+                  <a:schemeClr val="accent6"/>
+                </a:solidFill>
+              </a:rPr>
+              <a:t>command can be executed with an optional integer argument between 0 and 255. </a:t>
+            </a:r>
+            <a:r>
+              <a:rPr lang="en-US" sz="1600" dirty="0" smtClean="0">
+                <a:solidFill>
+                  <a:schemeClr val="bg1"/>
+                </a:solidFill>
+              </a:rPr>
+              <a:t/>
+            </a:r>
+            <a:br>
+              <a:rPr lang="en-US" sz="1600" dirty="0" smtClean="0">
+                <a:solidFill>
+                  <a:schemeClr val="bg1"/>
+                </a:solidFill>
+              </a:rPr>
+            </a:br>
+            <a:r>
+              <a:rPr lang="en-US" sz="1600" dirty="0" smtClean="0">
+                <a:solidFill>
+                  <a:srgbClr val="FF0000"/>
+                </a:solidFill>
+              </a:rPr>
+              <a:t>Exercises:</a:t>
+            </a:r>
+            <a:r>
+              <a:rPr lang="en-US" sz="1600" dirty="0" smtClean="0">
+                <a:solidFill>
+                  <a:schemeClr val="bg1"/>
+                </a:solidFill>
+              </a:rPr>
+              <a:t/>
+            </a:r>
+            <a:br>
+              <a:rPr lang="en-US" sz="1600" dirty="0" smtClean="0">
+                <a:solidFill>
+                  <a:schemeClr val="bg1"/>
+                </a:solidFill>
+              </a:rPr>
+            </a:br>
+            <a:r>
+              <a:rPr lang="en-US" sz="1600" dirty="0" smtClean="0">
+                <a:solidFill>
+                  <a:schemeClr val="bg1"/>
+                </a:solidFill>
+              </a:rPr>
+              <a:t>#!/bin/bash</a:t>
+            </a:r>
+            <a:br>
+              <a:rPr lang="en-US" sz="1600" dirty="0" smtClean="0">
+                <a:solidFill>
+                  <a:schemeClr val="bg1"/>
+                </a:solidFill>
+              </a:rPr>
+            </a:br>
+            <a:r>
+              <a:rPr lang="en-US" sz="1600" dirty="0" smtClean="0">
+                <a:solidFill>
+                  <a:schemeClr val="bg1"/>
+                </a:solidFill>
+              </a:rPr>
+              <a:t>echo “Hello, World!”</a:t>
+            </a:r>
+            <a:br>
+              <a:rPr lang="en-US" sz="1600" dirty="0" smtClean="0">
+                <a:solidFill>
+                  <a:schemeClr val="bg1"/>
+                </a:solidFill>
+              </a:rPr>
+            </a:br>
+            <a:r>
+              <a:rPr lang="en-US" sz="1600" dirty="0" smtClean="0">
+                <a:solidFill>
+                  <a:schemeClr val="bg1"/>
+                </a:solidFill>
+              </a:rPr>
+              <a:t>exit 0</a:t>
+            </a:r>
+            <a:r>
+              <a:rPr lang="en-US" sz="2400" dirty="0" smtClean="0">
+                <a:solidFill>
+                  <a:schemeClr val="bg2"/>
+                </a:solidFill>
+              </a:rPr>
+              <a:t/>
+            </a:r>
+            <a:br>
+              <a:rPr lang="en-US" sz="2400" dirty="0" smtClean="0">
+                <a:solidFill>
+                  <a:schemeClr val="bg2"/>
+                </a:solidFill>
+              </a:rPr>
+            </a:br>
+            <a:endParaRPr lang="en-US" sz="2400" dirty="0">
+              <a:solidFill>
+                <a:schemeClr val="accent6"/>
+              </a:solidFill>
+            </a:endParaRPr>
+          </a:p>
+        </p:txBody>
+      </p:sp>
+    </p:spTree>
+    <p:extLst>
+      <p:ext uri="{BB962C8B-B14F-4D97-AF65-F5344CB8AC3E}">
+        <p14:creationId xmlns:p14="http://schemas.microsoft.com/office/powerpoint/2010/main" val="174197410"/>
+      </p:ext>
+    </p:extLst>
+  </p:cSld>
+  <p:clrMapOvr>
+    <a:masterClrMapping/>
+  </p:clrMapOvr>
+</p:sld>
+</file>
+
+<file path=ppt/slides/slide11.xml><?xml version="1.0" encoding="utf-8"?>
+<p:sld xmlns:a="http://schemas.openxmlformats.org/drawingml/2006/main" xmlns:r="http://schemas.openxmlformats.org/officeDocument/2006/relationships" xmlns:p="http://schemas.openxmlformats.org/presentationml/2006/main">
+  <p:cSld>
+    <p:spTree>
+      <p:nvGrpSpPr>
+        <p:cNvPr id="1" name=""/>
+        <p:cNvGrpSpPr/>
+        <p:nvPr/>
+      </p:nvGrpSpPr>
+      <p:grpSpPr>
+        <a:xfrm>
+          <a:off x="0" y="0"/>
+          <a:ext cx="0" cy="0"/>
+          <a:chOff x="0" y="0"/>
+          <a:chExt cx="0" cy="0"/>
+        </a:xfrm>
+      </p:grpSpPr>
+      <p:sp>
+        <p:nvSpPr>
+          <p:cNvPr id="2" name="Title 1"/>
+          <p:cNvSpPr>
+            <a:spLocks noGrp="1"/>
+          </p:cNvSpPr>
+          <p:nvPr>
+            <p:ph type="title"/>
+          </p:nvPr>
+        </p:nvSpPr>
+        <p:spPr/>
+        <p:txBody>
+          <a:bodyPr/>
+          <a:lstStyle/>
+          <a:p>
+            <a:r>
+              <a:rPr lang="en-US" dirty="0" err="1" smtClean="0"/>
+              <a:t>I</a:t>
+            </a:r>
+            <a:r>
+              <a:rPr lang="en-US" dirty="0" err="1" smtClean="0">
+                <a:solidFill>
+                  <a:schemeClr val="accent6"/>
+                </a:solidFill>
+              </a:rPr>
+              <a:t>Integer</a:t>
+            </a:r>
+            <a:r>
+              <a:rPr lang="en-US" dirty="0" smtClean="0">
+                <a:solidFill>
+                  <a:schemeClr val="accent6"/>
+                </a:solidFill>
+              </a:rPr>
+              <a:t> comparison</a:t>
+            </a:r>
+            <a:endParaRPr lang="en-US" dirty="0"/>
+          </a:p>
+        </p:txBody>
+      </p:sp>
+      <p:graphicFrame>
+        <p:nvGraphicFramePr>
+          <p:cNvPr id="4" name="Content Placeholder 3"/>
+          <p:cNvGraphicFramePr>
+            <a:graphicFrameLocks noGrp="1"/>
+          </p:cNvGraphicFramePr>
+          <p:nvPr>
+            <p:ph idx="1"/>
+            <p:extLst>
+              <p:ext uri="{D42A27DB-BD31-4B8C-83A1-F6EECF244321}">
+                <p14:modId xmlns:p14="http://schemas.microsoft.com/office/powerpoint/2010/main" val="781078195"/>
+              </p:ext>
+            </p:extLst>
+          </p:nvPr>
+        </p:nvGraphicFramePr>
+        <p:xfrm>
+          <a:off x="457200" y="1600200"/>
+          <a:ext cx="8229600" cy="2595880"/>
+        </p:xfrm>
+        <a:graphic>
+          <a:graphicData uri="http://schemas.openxmlformats.org/drawingml/2006/table">
+            <a:tbl>
+              <a:tblPr firstRow="1" bandRow="1">
+                <a:tableStyleId>{5C22544A-7EE6-4342-B048-85BDC9FD1C3A}</a:tableStyleId>
+              </a:tblPr>
+              <a:tblGrid>
+                <a:gridCol w="2743200"/>
+                <a:gridCol w="2743200"/>
+                <a:gridCol w="2743200"/>
+              </a:tblGrid>
+              <a:tr h="370840">
+                <a:tc>
+                  <a:txBody>
+                    <a:bodyPr/>
+                    <a:lstStyle/>
+                    <a:p>
+                      <a:r>
+                        <a:rPr lang="en-US" dirty="0" smtClean="0"/>
+                        <a:t>Operator</a:t>
+                      </a:r>
+                      <a:endParaRPr lang="en-US" dirty="0"/>
+                    </a:p>
+                  </a:txBody>
+                  <a:tcPr/>
+                </a:tc>
+                <a:tc>
+                  <a:txBody>
+                    <a:bodyPr/>
+                    <a:lstStyle/>
+                    <a:p>
+                      <a:r>
+                        <a:rPr lang="en-US" dirty="0" smtClean="0"/>
+                        <a:t>Meaning</a:t>
+                      </a:r>
+                      <a:endParaRPr lang="en-US" dirty="0"/>
+                    </a:p>
+                  </a:txBody>
+                  <a:tcPr/>
+                </a:tc>
+                <a:tc>
+                  <a:txBody>
+                    <a:bodyPr/>
+                    <a:lstStyle/>
+                    <a:p>
+                      <a:r>
+                        <a:rPr lang="en-US" dirty="0" smtClean="0"/>
+                        <a:t>Example</a:t>
+                      </a:r>
+                      <a:endParaRPr lang="en-US" dirty="0"/>
+                    </a:p>
+                  </a:txBody>
+                  <a:tcPr/>
+                </a:tc>
+              </a:tr>
+              <a:tr h="370840">
+                <a:tc>
+                  <a:txBody>
+                    <a:bodyPr/>
+                    <a:lstStyle/>
+                    <a:p>
+                      <a:r>
+                        <a:rPr lang="en-US" dirty="0" smtClean="0"/>
+                        <a:t>-</a:t>
+                      </a:r>
+                      <a:r>
+                        <a:rPr lang="en-US" dirty="0" err="1" smtClean="0"/>
+                        <a:t>eq</a:t>
+                      </a:r>
+                      <a:endParaRPr lang="en-US" dirty="0"/>
+                    </a:p>
+                  </a:txBody>
+                  <a:tcPr/>
+                </a:tc>
+                <a:tc>
+                  <a:txBody>
+                    <a:bodyPr/>
+                    <a:lstStyle/>
+                    <a:p>
+                      <a:r>
+                        <a:rPr lang="en-US" dirty="0" smtClean="0"/>
+                        <a:t>Is equal to</a:t>
+                      </a:r>
+                      <a:endParaRPr lang="en-US" dirty="0"/>
+                    </a:p>
+                  </a:txBody>
+                  <a:tcPr/>
+                </a:tc>
+                <a:tc>
+                  <a:txBody>
+                    <a:bodyPr/>
+                    <a:lstStyle/>
+                    <a:p>
+                      <a:r>
+                        <a:rPr lang="en-US" dirty="0" smtClean="0"/>
+                        <a:t>[ “$a” </a:t>
+                      </a:r>
+                      <a:r>
+                        <a:rPr lang="mr-IN" dirty="0" smtClean="0"/>
+                        <a:t>–</a:t>
+                      </a:r>
+                      <a:r>
+                        <a:rPr lang="en-US" dirty="0" err="1" smtClean="0"/>
+                        <a:t>eq</a:t>
+                      </a:r>
+                      <a:r>
+                        <a:rPr lang="en-US" dirty="0" smtClean="0"/>
+                        <a:t> “$b” ]</a:t>
+                      </a:r>
+                      <a:endParaRPr lang="en-US" dirty="0"/>
+                    </a:p>
+                  </a:txBody>
+                  <a:tcPr/>
+                </a:tc>
+              </a:tr>
+              <a:tr h="370840">
+                <a:tc>
+                  <a:txBody>
+                    <a:bodyPr/>
+                    <a:lstStyle/>
+                    <a:p>
+                      <a:r>
+                        <a:rPr lang="en-US" dirty="0" smtClean="0"/>
+                        <a:t>-ne</a:t>
+                      </a:r>
+                      <a:endParaRPr lang="en-US" dirty="0"/>
+                    </a:p>
+                  </a:txBody>
+                  <a:tcPr/>
+                </a:tc>
+                <a:tc>
+                  <a:txBody>
+                    <a:bodyPr/>
+                    <a:lstStyle/>
+                    <a:p>
+                      <a:r>
+                        <a:rPr lang="en-US" dirty="0" smtClean="0"/>
+                        <a:t>Is not equal</a:t>
+                      </a:r>
+                      <a:r>
+                        <a:rPr lang="en-US" baseline="0" dirty="0" smtClean="0"/>
+                        <a:t> to</a:t>
+                      </a:r>
+                      <a:endParaRPr lang="en-US" dirty="0"/>
+                    </a:p>
+                  </a:txBody>
+                  <a:tcPr/>
+                </a:tc>
+                <a:tc>
+                  <a:txBody>
+                    <a:bodyPr/>
+                    <a:lstStyle/>
+                    <a:p>
+                      <a:r>
+                        <a:rPr lang="en-US" dirty="0" smtClean="0"/>
+                        <a:t>[ “$a” </a:t>
+                      </a:r>
+                      <a:r>
+                        <a:rPr lang="mr-IN" dirty="0" smtClean="0"/>
+                        <a:t>–</a:t>
+                      </a:r>
+                      <a:r>
+                        <a:rPr lang="en-US" dirty="0" smtClean="0"/>
+                        <a:t>ne</a:t>
+                      </a:r>
+                      <a:r>
+                        <a:rPr lang="en-US" baseline="0" dirty="0" smtClean="0"/>
+                        <a:t> “$b” </a:t>
+                      </a:r>
+                      <a:r>
+                        <a:rPr lang="en-US" dirty="0" smtClean="0"/>
+                        <a:t>]</a:t>
+                      </a:r>
+                      <a:endParaRPr lang="en-US" dirty="0"/>
+                    </a:p>
+                  </a:txBody>
+                  <a:tcPr/>
+                </a:tc>
+              </a:tr>
+              <a:tr h="370840">
+                <a:tc>
+                  <a:txBody>
+                    <a:bodyPr/>
+                    <a:lstStyle/>
+                    <a:p>
+                      <a:r>
+                        <a:rPr lang="en-US" dirty="0" smtClean="0"/>
+                        <a:t>-</a:t>
+                      </a:r>
+                      <a:r>
+                        <a:rPr lang="en-US" dirty="0" err="1" smtClean="0"/>
+                        <a:t>gt</a:t>
+                      </a:r>
+                      <a:endParaRPr lang="en-US" dirty="0"/>
+                    </a:p>
+                  </a:txBody>
+                  <a:tcPr/>
+                </a:tc>
+                <a:tc>
+                  <a:txBody>
+                    <a:bodyPr/>
+                    <a:lstStyle/>
+                    <a:p>
+                      <a:r>
+                        <a:rPr lang="en-US" dirty="0" smtClean="0"/>
+                        <a:t>Is greater than</a:t>
+                      </a:r>
+                      <a:endParaRPr lang="en-US" dirty="0"/>
+                    </a:p>
+                  </a:txBody>
+                  <a:tcPr/>
+                </a:tc>
+                <a:tc>
+                  <a:txBody>
+                    <a:bodyPr/>
+                    <a:lstStyle/>
+                    <a:p>
+                      <a:r>
+                        <a:rPr lang="en-US" dirty="0" smtClean="0"/>
+                        <a:t>[ “$a”</a:t>
+                      </a:r>
+                      <a:r>
+                        <a:rPr lang="en-US" baseline="0" dirty="0" smtClean="0"/>
+                        <a:t> </a:t>
+                      </a:r>
+                      <a:r>
+                        <a:rPr lang="mr-IN" baseline="0" dirty="0" smtClean="0"/>
+                        <a:t>–</a:t>
+                      </a:r>
+                      <a:r>
+                        <a:rPr lang="en-US" baseline="0" dirty="0" err="1" smtClean="0"/>
+                        <a:t>gt</a:t>
+                      </a:r>
+                      <a:r>
+                        <a:rPr lang="en-US" baseline="0" dirty="0" smtClean="0"/>
+                        <a:t> “$b” </a:t>
+                      </a:r>
+                      <a:r>
+                        <a:rPr lang="en-US" dirty="0" smtClean="0"/>
+                        <a:t>]</a:t>
+                      </a:r>
+                      <a:endParaRPr lang="en-US" dirty="0"/>
+                    </a:p>
+                  </a:txBody>
+                  <a:tcPr/>
+                </a:tc>
+              </a:tr>
+              <a:tr h="370840">
+                <a:tc>
+                  <a:txBody>
+                    <a:bodyPr/>
+                    <a:lstStyle/>
+                    <a:p>
+                      <a:r>
+                        <a:rPr lang="en-US" dirty="0" smtClean="0"/>
+                        <a:t>-</a:t>
+                      </a:r>
+                      <a:r>
+                        <a:rPr lang="en-US" dirty="0" err="1" smtClean="0"/>
+                        <a:t>ge</a:t>
+                      </a:r>
+                      <a:endParaRPr lang="en-US" dirty="0"/>
+                    </a:p>
+                  </a:txBody>
+                  <a:tcPr/>
+                </a:tc>
+                <a:tc>
+                  <a:txBody>
+                    <a:bodyPr/>
+                    <a:lstStyle/>
+                    <a:p>
+                      <a:r>
+                        <a:rPr lang="en-US" dirty="0" smtClean="0"/>
+                        <a:t>Is greater than or equal</a:t>
+                      </a:r>
+                      <a:r>
+                        <a:rPr lang="en-US" baseline="0" dirty="0" smtClean="0"/>
+                        <a:t> to</a:t>
+                      </a:r>
+                      <a:endParaRPr lang="en-US" dirty="0"/>
+                    </a:p>
+                  </a:txBody>
+                  <a:tcPr/>
+                </a:tc>
+                <a:tc>
+                  <a:txBody>
+                    <a:bodyPr/>
+                    <a:lstStyle/>
+                    <a:p>
+                      <a:r>
+                        <a:rPr lang="en-US" dirty="0" smtClean="0"/>
+                        <a:t>[ “$a” </a:t>
+                      </a:r>
+                      <a:r>
+                        <a:rPr lang="mr-IN" dirty="0" smtClean="0"/>
+                        <a:t>–</a:t>
+                      </a:r>
+                      <a:r>
+                        <a:rPr lang="en-US" dirty="0" err="1" smtClean="0"/>
+                        <a:t>ge</a:t>
+                      </a:r>
+                      <a:r>
+                        <a:rPr lang="en-US" dirty="0" smtClean="0"/>
+                        <a:t> “$b” ]</a:t>
+                      </a:r>
+                      <a:endParaRPr lang="en-US" dirty="0"/>
+                    </a:p>
+                  </a:txBody>
+                  <a:tcPr/>
+                </a:tc>
+              </a:tr>
+              <a:tr h="370840">
+                <a:tc>
+                  <a:txBody>
+                    <a:bodyPr/>
+                    <a:lstStyle/>
+                    <a:p>
+                      <a:r>
+                        <a:rPr lang="en-US" dirty="0" smtClean="0"/>
+                        <a:t>-</a:t>
+                      </a:r>
+                      <a:r>
+                        <a:rPr lang="en-US" dirty="0" err="1" smtClean="0"/>
+                        <a:t>lt</a:t>
+                      </a:r>
+                      <a:endParaRPr lang="en-US" dirty="0"/>
+                    </a:p>
+                  </a:txBody>
+                  <a:tcPr/>
+                </a:tc>
+                <a:tc>
+                  <a:txBody>
+                    <a:bodyPr/>
+                    <a:lstStyle/>
+                    <a:p>
+                      <a:r>
+                        <a:rPr lang="en-US" dirty="0" smtClean="0"/>
+                        <a:t>Is less than</a:t>
+                      </a:r>
+                      <a:endParaRPr lang="en-US" dirty="0"/>
+                    </a:p>
+                  </a:txBody>
+                  <a:tcPr/>
+                </a:tc>
+                <a:tc>
+                  <a:txBody>
+                    <a:bodyPr/>
+                    <a:lstStyle/>
+                    <a:p>
+                      <a:r>
+                        <a:rPr lang="en-US" dirty="0" smtClean="0"/>
+                        <a:t>[ “$a” </a:t>
+                      </a:r>
+                      <a:r>
+                        <a:rPr lang="mr-IN" dirty="0" smtClean="0"/>
+                        <a:t>–</a:t>
+                      </a:r>
+                      <a:r>
+                        <a:rPr lang="en-US" dirty="0" err="1" smtClean="0"/>
+                        <a:t>lt</a:t>
+                      </a:r>
+                      <a:r>
+                        <a:rPr lang="en-US" dirty="0" smtClean="0"/>
+                        <a:t> “$b” ]</a:t>
+                      </a:r>
+                      <a:endParaRPr lang="en-US" dirty="0"/>
+                    </a:p>
+                  </a:txBody>
+                  <a:tcPr/>
+                </a:tc>
+              </a:tr>
+              <a:tr h="370840">
+                <a:tc>
+                  <a:txBody>
+                    <a:bodyPr/>
+                    <a:lstStyle/>
+                    <a:p>
+                      <a:r>
+                        <a:rPr lang="en-US" dirty="0" smtClean="0"/>
+                        <a:t>-le</a:t>
+                      </a:r>
+                      <a:endParaRPr lang="en-US" dirty="0"/>
+                    </a:p>
+                  </a:txBody>
+                  <a:tcPr/>
+                </a:tc>
+                <a:tc>
+                  <a:txBody>
+                    <a:bodyPr/>
+                    <a:lstStyle/>
+                    <a:p>
+                      <a:r>
+                        <a:rPr lang="en-US" dirty="0" smtClean="0"/>
+                        <a:t>Is</a:t>
+                      </a:r>
+                      <a:r>
+                        <a:rPr lang="en-US" baseline="0" dirty="0" smtClean="0"/>
+                        <a:t> less than or </a:t>
+                      </a:r>
+                      <a:r>
+                        <a:rPr lang="en-US" baseline="0" dirty="0" err="1" smtClean="0"/>
+                        <a:t>erqual</a:t>
+                      </a:r>
+                      <a:r>
+                        <a:rPr lang="en-US" baseline="0" dirty="0" smtClean="0"/>
+                        <a:t> to</a:t>
+                      </a:r>
+                      <a:endParaRPr lang="en-US" dirty="0"/>
+                    </a:p>
+                  </a:txBody>
+                  <a:tcPr/>
+                </a:tc>
+                <a:tc>
+                  <a:txBody>
+                    <a:bodyPr/>
+                    <a:lstStyle/>
+                    <a:p>
+                      <a:r>
+                        <a:rPr lang="en-US" dirty="0" smtClean="0"/>
+                        <a:t>[ “$a” </a:t>
+                      </a:r>
+                      <a:r>
+                        <a:rPr lang="mr-IN" dirty="0" smtClean="0"/>
+                        <a:t>–</a:t>
+                      </a:r>
+                      <a:r>
+                        <a:rPr lang="en-US" dirty="0" smtClean="0"/>
+                        <a:t>le “$b” ]</a:t>
+                      </a:r>
+                      <a:endParaRPr lang="en-US" dirty="0"/>
+                    </a:p>
+                  </a:txBody>
+                  <a:tcPr/>
+                </a:tc>
+              </a:tr>
+            </a:tbl>
+          </a:graphicData>
+        </a:graphic>
+      </p:graphicFrame>
+    </p:spTree>
+    <p:extLst>
+      <p:ext uri="{BB962C8B-B14F-4D97-AF65-F5344CB8AC3E}">
+        <p14:creationId xmlns:p14="http://schemas.microsoft.com/office/powerpoint/2010/main" val="587263705"/>
+      </p:ext>
+    </p:extLst>
+  </p:cSld>
+  <p:clrMapOvr>
+    <a:masterClrMapping/>
+  </p:clrMapOvr>
+</p:sld>
+</file>
+
+<file path=ppt/slides/slide12.xml><?xml version="1.0" encoding="utf-8"?>
+<p:sld xmlns:a="http://schemas.openxmlformats.org/drawingml/2006/main" xmlns:r="http://schemas.openxmlformats.org/officeDocument/2006/relationships" xmlns:p="http://schemas.openxmlformats.org/presentationml/2006/main">
+  <p:cSld>
+    <p:spTree>
+      <p:nvGrpSpPr>
+        <p:cNvPr id="1" name=""/>
+        <p:cNvGrpSpPr/>
+        <p:nvPr/>
+      </p:nvGrpSpPr>
+      <p:grpSpPr>
+        <a:xfrm>
+          <a:off x="0" y="0"/>
+          <a:ext cx="0" cy="0"/>
+          <a:chOff x="0" y="0"/>
+          <a:chExt cx="0" cy="0"/>
+        </a:xfrm>
+      </p:grpSpPr>
+      <p:sp>
+        <p:nvSpPr>
+          <p:cNvPr id="2" name="Title 1"/>
+          <p:cNvSpPr>
+            <a:spLocks noGrp="1"/>
+          </p:cNvSpPr>
+          <p:nvPr>
+            <p:ph type="title"/>
+          </p:nvPr>
+        </p:nvSpPr>
+        <p:spPr/>
+        <p:txBody>
+          <a:bodyPr/>
+          <a:lstStyle/>
+          <a:p>
+            <a:r>
+              <a:rPr lang="en-US" dirty="0" err="1" smtClean="0"/>
+              <a:t>I</a:t>
+            </a:r>
+            <a:r>
+              <a:rPr lang="en-US" dirty="0" err="1" smtClean="0">
+                <a:solidFill>
+                  <a:schemeClr val="accent6"/>
+                </a:solidFill>
+              </a:rPr>
+              <a:t>String</a:t>
+            </a:r>
+            <a:r>
+              <a:rPr lang="en-US" dirty="0" smtClean="0">
+                <a:solidFill>
+                  <a:schemeClr val="accent6"/>
+                </a:solidFill>
+              </a:rPr>
+              <a:t> comparison</a:t>
+            </a:r>
+            <a:endParaRPr lang="en-US" dirty="0"/>
+          </a:p>
+        </p:txBody>
+      </p:sp>
+      <p:graphicFrame>
+        <p:nvGraphicFramePr>
+          <p:cNvPr id="4" name="Content Placeholder 3"/>
+          <p:cNvGraphicFramePr>
+            <a:graphicFrameLocks noGrp="1"/>
+          </p:cNvGraphicFramePr>
+          <p:nvPr>
+            <p:ph idx="1"/>
+            <p:extLst>
+              <p:ext uri="{D42A27DB-BD31-4B8C-83A1-F6EECF244321}">
+                <p14:modId xmlns:p14="http://schemas.microsoft.com/office/powerpoint/2010/main" val="954025530"/>
+              </p:ext>
+            </p:extLst>
+          </p:nvPr>
+        </p:nvGraphicFramePr>
+        <p:xfrm>
+          <a:off x="457200" y="1417636"/>
+          <a:ext cx="8229600" cy="1665924"/>
+        </p:xfrm>
+        <a:graphic>
+          <a:graphicData uri="http://schemas.openxmlformats.org/drawingml/2006/table">
+            <a:tbl>
+              <a:tblPr firstRow="1" bandRow="1">
+                <a:tableStyleId>{5C22544A-7EE6-4342-B048-85BDC9FD1C3A}</a:tableStyleId>
+              </a:tblPr>
+              <a:tblGrid>
+                <a:gridCol w="2743200"/>
+                <a:gridCol w="2743200"/>
+                <a:gridCol w="2743200"/>
+              </a:tblGrid>
+              <a:tr h="416481">
+                <a:tc>
+                  <a:txBody>
+                    <a:bodyPr/>
+                    <a:lstStyle/>
+                    <a:p>
+                      <a:r>
+                        <a:rPr lang="en-US" dirty="0" smtClean="0"/>
+                        <a:t>Operator</a:t>
+                      </a:r>
+                      <a:endParaRPr lang="en-US" dirty="0"/>
+                    </a:p>
+                  </a:txBody>
+                  <a:tcPr/>
+                </a:tc>
+                <a:tc>
+                  <a:txBody>
+                    <a:bodyPr/>
+                    <a:lstStyle/>
+                    <a:p>
+                      <a:r>
+                        <a:rPr lang="en-US" dirty="0" smtClean="0"/>
+                        <a:t>Meaning</a:t>
+                      </a:r>
+                      <a:endParaRPr lang="en-US" dirty="0"/>
+                    </a:p>
+                  </a:txBody>
+                  <a:tcPr/>
+                </a:tc>
+                <a:tc>
+                  <a:txBody>
+                    <a:bodyPr/>
+                    <a:lstStyle/>
+                    <a:p>
+                      <a:r>
+                        <a:rPr lang="en-US" dirty="0" smtClean="0"/>
+                        <a:t>Example</a:t>
+                      </a:r>
+                      <a:endParaRPr lang="en-US" dirty="0"/>
+                    </a:p>
+                  </a:txBody>
+                  <a:tcPr/>
+                </a:tc>
+              </a:tr>
+              <a:tr h="416481">
+                <a:tc>
+                  <a:txBody>
+                    <a:bodyPr/>
+                    <a:lstStyle/>
+                    <a:p>
+                      <a:r>
+                        <a:rPr lang="en-US" dirty="0" smtClean="0"/>
+                        <a:t>=</a:t>
+                      </a:r>
+                      <a:endParaRPr lang="en-US" dirty="0"/>
+                    </a:p>
+                  </a:txBody>
+                  <a:tcPr/>
+                </a:tc>
+                <a:tc>
+                  <a:txBody>
+                    <a:bodyPr/>
+                    <a:lstStyle/>
+                    <a:p>
+                      <a:r>
+                        <a:rPr lang="en-US" dirty="0" smtClean="0"/>
+                        <a:t>Is equal to</a:t>
+                      </a:r>
+                      <a:endParaRPr lang="en-US" dirty="0"/>
+                    </a:p>
+                  </a:txBody>
+                  <a:tcPr/>
+                </a:tc>
+                <a:tc>
+                  <a:txBody>
+                    <a:bodyPr/>
+                    <a:lstStyle/>
+                    <a:p>
+                      <a:r>
+                        <a:rPr lang="en-US" dirty="0" smtClean="0"/>
+                        <a:t>[ “$a” = “$b” ]</a:t>
+                      </a:r>
+                      <a:endParaRPr lang="en-US" dirty="0"/>
+                    </a:p>
+                  </a:txBody>
+                  <a:tcPr/>
+                </a:tc>
+              </a:tr>
+              <a:tr h="416481">
+                <a:tc>
+                  <a:txBody>
+                    <a:bodyPr/>
+                    <a:lstStyle/>
+                    <a:p>
+                      <a:r>
+                        <a:rPr lang="en-US" dirty="0" smtClean="0"/>
+                        <a:t>==</a:t>
+                      </a:r>
+                      <a:endParaRPr lang="en-US" dirty="0"/>
+                    </a:p>
+                  </a:txBody>
+                  <a:tcPr/>
+                </a:tc>
+                <a:tc>
+                  <a:txBody>
+                    <a:bodyPr/>
+                    <a:lstStyle/>
+                    <a:p>
+                      <a:r>
+                        <a:rPr lang="en-US" dirty="0" smtClean="0"/>
+                        <a:t>Is equal to</a:t>
+                      </a:r>
+                      <a:endParaRPr lang="en-US" dirty="0"/>
+                    </a:p>
+                  </a:txBody>
+                  <a:tcPr/>
+                </a:tc>
+                <a:tc>
+                  <a:txBody>
+                    <a:bodyPr/>
+                    <a:lstStyle/>
+                    <a:p>
+                      <a:r>
+                        <a:rPr lang="en-US" dirty="0" smtClean="0"/>
+                        <a:t>[ “$a” ==</a:t>
+                      </a:r>
+                      <a:r>
+                        <a:rPr lang="en-US" baseline="0" dirty="0" smtClean="0"/>
+                        <a:t> “$b” </a:t>
+                      </a:r>
+                      <a:r>
+                        <a:rPr lang="en-US" dirty="0" smtClean="0"/>
+                        <a:t>]</a:t>
+                      </a:r>
+                      <a:endParaRPr lang="en-US" dirty="0"/>
+                    </a:p>
+                  </a:txBody>
+                  <a:tcPr/>
+                </a:tc>
+              </a:tr>
+              <a:tr h="416481">
+                <a:tc>
+                  <a:txBody>
+                    <a:bodyPr/>
+                    <a:lstStyle/>
+                    <a:p>
+                      <a:r>
+                        <a:rPr lang="en-US" dirty="0" smtClean="0"/>
+                        <a:t>!=</a:t>
+                      </a:r>
+                      <a:endParaRPr lang="en-US" dirty="0"/>
+                    </a:p>
+                  </a:txBody>
+                  <a:tcPr/>
+                </a:tc>
+                <a:tc>
+                  <a:txBody>
+                    <a:bodyPr/>
+                    <a:lstStyle/>
+                    <a:p>
+                      <a:r>
+                        <a:rPr lang="en-US" dirty="0" smtClean="0"/>
+                        <a:t>Is not equal to</a:t>
+                      </a:r>
+                      <a:endParaRPr lang="en-US" dirty="0"/>
+                    </a:p>
+                  </a:txBody>
+                  <a:tcPr/>
+                </a:tc>
+                <a:tc>
+                  <a:txBody>
+                    <a:bodyPr/>
+                    <a:lstStyle/>
+                    <a:p>
+                      <a:r>
+                        <a:rPr lang="en-US" dirty="0" smtClean="0"/>
+                        <a:t>[ “$a”</a:t>
+                      </a:r>
+                      <a:r>
+                        <a:rPr lang="en-US" baseline="0" dirty="0" smtClean="0"/>
+                        <a:t> != “$b” </a:t>
+                      </a:r>
+                      <a:r>
+                        <a:rPr lang="en-US" dirty="0" smtClean="0"/>
+                        <a:t>]</a:t>
+                      </a:r>
+                      <a:endParaRPr lang="en-US" dirty="0"/>
+                    </a:p>
+                  </a:txBody>
+                  <a:tcPr/>
+                </a:tc>
+              </a:tr>
+            </a:tbl>
+          </a:graphicData>
+        </a:graphic>
+      </p:graphicFrame>
+      <p:sp>
+        <p:nvSpPr>
+          <p:cNvPr id="3" name="TextBox 2"/>
+          <p:cNvSpPr txBox="1"/>
+          <p:nvPr/>
+        </p:nvSpPr>
+        <p:spPr>
+          <a:xfrm>
+            <a:off x="1219200" y="3810000"/>
+            <a:ext cx="7620000" cy="2585323"/>
+          </a:xfrm>
+          <a:prstGeom prst="rect">
+            <a:avLst/>
+          </a:prstGeom>
+          <a:noFill/>
+        </p:spPr>
+        <p:txBody>
+          <a:bodyPr wrap="square" rtlCol="0">
+            <a:spAutoFit/>
+          </a:bodyPr>
+          <a:lstStyle/>
+          <a:p>
+            <a:r>
+              <a:rPr lang="en-US" dirty="0">
+                <a:solidFill>
+                  <a:schemeClr val="accent6"/>
+                </a:solidFill>
+              </a:rPr>
+              <a:t>	</a:t>
+            </a:r>
+            <a:r>
+              <a:rPr lang="en-US" dirty="0" smtClean="0">
+                <a:solidFill>
+                  <a:schemeClr val="accent6"/>
+                </a:solidFill>
+              </a:rPr>
+              <a:t>Examples:</a:t>
+            </a:r>
+          </a:p>
+          <a:p>
+            <a:r>
+              <a:rPr lang="en-US" dirty="0" smtClean="0">
+                <a:solidFill>
+                  <a:schemeClr val="accent6"/>
+                </a:solidFill>
+              </a:rPr>
+              <a:t>[ 1 </a:t>
+            </a:r>
+            <a:r>
+              <a:rPr lang="en-US" dirty="0" err="1" smtClean="0">
+                <a:solidFill>
+                  <a:schemeClr val="accent6"/>
+                </a:solidFill>
+              </a:rPr>
+              <a:t>eq</a:t>
+            </a:r>
+            <a:r>
+              <a:rPr lang="en-US" dirty="0" smtClean="0">
+                <a:solidFill>
+                  <a:schemeClr val="accent6"/>
+                </a:solidFill>
+              </a:rPr>
+              <a:t> 1]; echo $?</a:t>
+            </a:r>
+          </a:p>
+          <a:p>
+            <a:r>
+              <a:rPr lang="en-US" dirty="0" smtClean="0">
+                <a:solidFill>
+                  <a:schemeClr val="accent6"/>
+                </a:solidFill>
+              </a:rPr>
+              <a:t>[ 8 </a:t>
+            </a:r>
+            <a:r>
+              <a:rPr lang="en-US" dirty="0" err="1" smtClean="0">
+                <a:solidFill>
+                  <a:schemeClr val="accent6"/>
+                </a:solidFill>
+              </a:rPr>
+              <a:t>gt</a:t>
+            </a:r>
+            <a:r>
+              <a:rPr lang="en-US" dirty="0" smtClean="0">
+                <a:solidFill>
+                  <a:schemeClr val="accent6"/>
+                </a:solidFill>
+              </a:rPr>
+              <a:t> 2]; echo $?</a:t>
+            </a:r>
+          </a:p>
+          <a:p>
+            <a:endParaRPr lang="en-US" dirty="0">
+              <a:solidFill>
+                <a:schemeClr val="accent6"/>
+              </a:solidFill>
+            </a:endParaRPr>
+          </a:p>
+          <a:p>
+            <a:r>
+              <a:rPr lang="en-US" dirty="0" smtClean="0">
+                <a:solidFill>
+                  <a:schemeClr val="accent6"/>
+                </a:solidFill>
+              </a:rPr>
+              <a:t>[ </a:t>
+            </a:r>
+            <a:r>
+              <a:rPr lang="en-US" dirty="0" err="1" smtClean="0">
+                <a:solidFill>
+                  <a:schemeClr val="accent6"/>
+                </a:solidFill>
+              </a:rPr>
+              <a:t>abc</a:t>
+            </a:r>
+            <a:r>
+              <a:rPr lang="en-US" dirty="0" smtClean="0">
+                <a:solidFill>
+                  <a:schemeClr val="accent6"/>
+                </a:solidFill>
+              </a:rPr>
+              <a:t> = </a:t>
+            </a:r>
+            <a:r>
+              <a:rPr lang="en-US" dirty="0" err="1" smtClean="0">
+                <a:solidFill>
+                  <a:schemeClr val="accent6"/>
+                </a:solidFill>
+              </a:rPr>
+              <a:t>abc</a:t>
+            </a:r>
+            <a:r>
+              <a:rPr lang="en-US" dirty="0" smtClean="0">
+                <a:solidFill>
+                  <a:schemeClr val="accent6"/>
+                </a:solidFill>
+              </a:rPr>
+              <a:t> ]; echo $?</a:t>
+            </a:r>
+          </a:p>
+          <a:p>
+            <a:endParaRPr lang="en-US" dirty="0">
+              <a:solidFill>
+                <a:schemeClr val="accent6"/>
+              </a:solidFill>
+            </a:endParaRPr>
+          </a:p>
+          <a:p>
+            <a:r>
+              <a:rPr lang="en-US" dirty="0" smtClean="0">
+                <a:solidFill>
+                  <a:srgbClr val="FF0000"/>
+                </a:solidFill>
+              </a:rPr>
+              <a:t>Exercises:</a:t>
+            </a:r>
+          </a:p>
+          <a:p>
+            <a:pPr marL="342900" indent="-342900">
+              <a:buAutoNum type="arabicPeriod"/>
+            </a:pPr>
+            <a:r>
+              <a:rPr lang="en-US" dirty="0" smtClean="0">
+                <a:solidFill>
+                  <a:schemeClr val="accent6"/>
+                </a:solidFill>
+              </a:rPr>
+              <a:t>Write a bash script that takes 2 numbers and compares them, use if else statements, google them.</a:t>
+            </a:r>
+          </a:p>
+        </p:txBody>
+      </p:sp>
+    </p:spTree>
+    <p:extLst>
+      <p:ext uri="{BB962C8B-B14F-4D97-AF65-F5344CB8AC3E}">
+        <p14:creationId xmlns:p14="http://schemas.microsoft.com/office/powerpoint/2010/main" val="1607740436"/>
+      </p:ext>
+    </p:extLst>
+  </p:cSld>
+  <p:clrMapOvr>
+    <a:masterClrMapping/>
+  </p:clrMapOvr>
+</p:sld>
+</file>
+
+<file path=ppt/slides/slide13.xml><?xml version="1.0" encoding="utf-8"?>
+<p:sld xmlns:a="http://schemas.openxmlformats.org/drawingml/2006/main" xmlns:r="http://schemas.openxmlformats.org/officeDocument/2006/relationships" xmlns:p="http://schemas.openxmlformats.org/presentationml/2006/main">
+  <p:cSld>
+    <p:spTree>
+      <p:nvGrpSpPr>
+        <p:cNvPr id="1" name=""/>
+        <p:cNvGrpSpPr/>
+        <p:nvPr/>
+      </p:nvGrpSpPr>
+      <p:grpSpPr>
+        <a:xfrm>
+          <a:off x="0" y="0"/>
+          <a:ext cx="0" cy="0"/>
+          <a:chOff x="0" y="0"/>
+          <a:chExt cx="0" cy="0"/>
+        </a:xfrm>
+      </p:grpSpPr>
+      <p:sp>
+        <p:nvSpPr>
+          <p:cNvPr id="2" name="Title 1"/>
+          <p:cNvSpPr>
+            <a:spLocks noGrp="1"/>
+          </p:cNvSpPr>
+          <p:nvPr>
+            <p:ph type="title"/>
+          </p:nvPr>
+        </p:nvSpPr>
+        <p:spPr/>
+        <p:txBody>
+          <a:bodyPr>
+            <a:normAutofit fontScale="90000"/>
+          </a:bodyPr>
+          <a:lstStyle/>
+          <a:p>
+            <a:r>
+              <a:rPr lang="en-US" dirty="0" smtClean="0">
+                <a:solidFill>
+                  <a:schemeClr val="accent6"/>
+                </a:solidFill>
+              </a:rPr>
+              <a:t/>
+            </a:r>
+            <a:br>
+              <a:rPr lang="en-US" dirty="0" smtClean="0">
+                <a:solidFill>
+                  <a:schemeClr val="accent6"/>
+                </a:solidFill>
+              </a:rPr>
+            </a:br>
+            <a:r>
+              <a:rPr lang="en-US" dirty="0">
+                <a:solidFill>
+                  <a:schemeClr val="accent6"/>
+                </a:solidFill>
+              </a:rPr>
+              <a:t/>
+            </a:r>
+            <a:br>
+              <a:rPr lang="en-US" dirty="0">
+                <a:solidFill>
+                  <a:schemeClr val="accent6"/>
+                </a:solidFill>
+              </a:rPr>
+            </a:br>
+            <a:r>
+              <a:rPr lang="en-US" dirty="0" smtClean="0">
+                <a:solidFill>
+                  <a:schemeClr val="accent6"/>
+                </a:solidFill>
+              </a:rPr>
+              <a:t/>
+            </a:r>
+            <a:br>
+              <a:rPr lang="en-US" dirty="0" smtClean="0">
+                <a:solidFill>
+                  <a:schemeClr val="accent6"/>
+                </a:solidFill>
+              </a:rPr>
+            </a:br>
+            <a:r>
+              <a:rPr lang="en-US" dirty="0">
+                <a:solidFill>
+                  <a:schemeClr val="accent6"/>
+                </a:solidFill>
+              </a:rPr>
+              <a:t/>
+            </a:r>
+            <a:br>
+              <a:rPr lang="en-US" dirty="0">
+                <a:solidFill>
+                  <a:schemeClr val="accent6"/>
+                </a:solidFill>
+              </a:rPr>
+            </a:br>
+            <a:r>
+              <a:rPr lang="en-US" dirty="0" smtClean="0">
+                <a:solidFill>
+                  <a:schemeClr val="accent6"/>
+                </a:solidFill>
+              </a:rPr>
+              <a:t/>
+            </a:r>
+            <a:br>
+              <a:rPr lang="en-US" dirty="0" smtClean="0">
+                <a:solidFill>
+                  <a:schemeClr val="accent6"/>
+                </a:solidFill>
+              </a:rPr>
+            </a:br>
+            <a:r>
+              <a:rPr lang="en-US" dirty="0">
+                <a:solidFill>
+                  <a:schemeClr val="accent6"/>
+                </a:solidFill>
+              </a:rPr>
+              <a:t/>
+            </a:r>
+            <a:br>
+              <a:rPr lang="en-US" dirty="0">
+                <a:solidFill>
+                  <a:schemeClr val="accent6"/>
+                </a:solidFill>
+              </a:rPr>
+            </a:br>
+            <a:r>
+              <a:rPr lang="en-US" dirty="0" smtClean="0">
+                <a:solidFill>
+                  <a:schemeClr val="accent6"/>
+                </a:solidFill>
+              </a:rPr>
+              <a:t/>
+            </a:r>
+            <a:br>
+              <a:rPr lang="en-US" dirty="0" smtClean="0">
+                <a:solidFill>
+                  <a:schemeClr val="accent6"/>
+                </a:solidFill>
+              </a:rPr>
+            </a:br>
+            <a:r>
+              <a:rPr lang="en-US" dirty="0">
+                <a:solidFill>
+                  <a:schemeClr val="accent6"/>
+                </a:solidFill>
+              </a:rPr>
+              <a:t/>
+            </a:r>
+            <a:br>
+              <a:rPr lang="en-US" dirty="0">
+                <a:solidFill>
+                  <a:schemeClr val="accent6"/>
+                </a:solidFill>
+              </a:rPr>
+            </a:br>
+            <a:r>
+              <a:rPr lang="en-US" dirty="0" smtClean="0">
+                <a:solidFill>
+                  <a:schemeClr val="accent6"/>
+                </a:solidFill>
+              </a:rPr>
+              <a:t/>
+            </a:r>
+            <a:br>
+              <a:rPr lang="en-US" dirty="0" smtClean="0">
+                <a:solidFill>
+                  <a:schemeClr val="accent6"/>
+                </a:solidFill>
+              </a:rPr>
+            </a:br>
+            <a:r>
+              <a:rPr lang="en-US" dirty="0">
+                <a:solidFill>
+                  <a:schemeClr val="accent6"/>
+                </a:solidFill>
+              </a:rPr>
+              <a:t/>
+            </a:r>
+            <a:br>
+              <a:rPr lang="en-US" dirty="0">
+                <a:solidFill>
+                  <a:schemeClr val="accent6"/>
+                </a:solidFill>
+              </a:rPr>
+            </a:br>
+            <a:r>
+              <a:rPr lang="en-US" sz="2200" dirty="0" smtClean="0">
+                <a:solidFill>
+                  <a:schemeClr val="accent6"/>
+                </a:solidFill>
+              </a:rPr>
+              <a:t>Functions, grouping a logical piece of code together.</a:t>
+            </a:r>
+            <a:br>
+              <a:rPr lang="en-US" sz="2200" dirty="0" smtClean="0">
+                <a:solidFill>
+                  <a:schemeClr val="accent6"/>
+                </a:solidFill>
+              </a:rPr>
+            </a:br>
+            <a:r>
+              <a:rPr lang="en-US" sz="2200" dirty="0">
+                <a:solidFill>
+                  <a:schemeClr val="accent6"/>
+                </a:solidFill>
+              </a:rPr>
+              <a:t/>
+            </a:r>
+            <a:br>
+              <a:rPr lang="en-US" sz="2200" dirty="0">
+                <a:solidFill>
+                  <a:schemeClr val="accent6"/>
+                </a:solidFill>
+              </a:rPr>
+            </a:br>
+            <a:r>
+              <a:rPr lang="en-US" sz="2200" dirty="0" smtClean="0">
+                <a:solidFill>
+                  <a:schemeClr val="bg1"/>
+                </a:solidFill>
+              </a:rPr>
+              <a:t>#!/bin/bash</a:t>
+            </a:r>
+            <a:br>
+              <a:rPr lang="en-US" sz="2200" dirty="0" smtClean="0">
+                <a:solidFill>
+                  <a:schemeClr val="bg1"/>
+                </a:solidFill>
+              </a:rPr>
+            </a:br>
+            <a:r>
+              <a:rPr lang="en-US" sz="2200" dirty="0">
+                <a:solidFill>
+                  <a:schemeClr val="bg1"/>
+                </a:solidFill>
+              </a:rPr>
+              <a:t/>
+            </a:r>
+            <a:br>
+              <a:rPr lang="en-US" sz="2200" dirty="0">
+                <a:solidFill>
+                  <a:schemeClr val="bg1"/>
+                </a:solidFill>
+              </a:rPr>
+            </a:br>
+            <a:r>
+              <a:rPr lang="en-US" sz="2200" dirty="0" smtClean="0">
+                <a:solidFill>
+                  <a:schemeClr val="bg1"/>
+                </a:solidFill>
+              </a:rPr>
+              <a:t>function greet {</a:t>
+            </a:r>
+            <a:br>
+              <a:rPr lang="en-US" sz="2200" dirty="0" smtClean="0">
+                <a:solidFill>
+                  <a:schemeClr val="bg1"/>
+                </a:solidFill>
+              </a:rPr>
+            </a:br>
+            <a:r>
+              <a:rPr lang="en-US" sz="2200" dirty="0" smtClean="0">
+                <a:solidFill>
+                  <a:schemeClr val="bg1"/>
+                </a:solidFill>
+              </a:rPr>
+              <a:t>	echo “hello”</a:t>
+            </a:r>
+            <a:r>
+              <a:rPr lang="en-US" sz="2200" dirty="0">
+                <a:solidFill>
+                  <a:schemeClr val="bg1"/>
+                </a:solidFill>
+              </a:rPr>
+              <a:t/>
+            </a:r>
+            <a:br>
+              <a:rPr lang="en-US" sz="2200" dirty="0">
+                <a:solidFill>
+                  <a:schemeClr val="bg1"/>
+                </a:solidFill>
+              </a:rPr>
+            </a:br>
+            <a:r>
+              <a:rPr lang="en-US" sz="2200" dirty="0" smtClean="0">
+                <a:solidFill>
+                  <a:schemeClr val="bg1"/>
+                </a:solidFill>
+              </a:rPr>
+              <a:t>}</a:t>
+            </a:r>
+            <a:br>
+              <a:rPr lang="en-US" sz="2200" dirty="0" smtClean="0">
+                <a:solidFill>
+                  <a:schemeClr val="bg1"/>
+                </a:solidFill>
+              </a:rPr>
+            </a:br>
+            <a:r>
+              <a:rPr lang="en-US" sz="2200" dirty="0">
+                <a:solidFill>
+                  <a:schemeClr val="bg1"/>
+                </a:solidFill>
+              </a:rPr>
+              <a:t/>
+            </a:r>
+            <a:br>
+              <a:rPr lang="en-US" sz="2200" dirty="0">
+                <a:solidFill>
+                  <a:schemeClr val="bg1"/>
+                </a:solidFill>
+              </a:rPr>
+            </a:br>
+            <a:r>
+              <a:rPr lang="en-US" sz="2200" dirty="0" smtClean="0">
+                <a:solidFill>
+                  <a:schemeClr val="bg1"/>
+                </a:solidFill>
+              </a:rPr>
+              <a:t>greet</a:t>
+            </a:r>
+            <a:br>
+              <a:rPr lang="en-US" sz="2200" dirty="0" smtClean="0">
+                <a:solidFill>
+                  <a:schemeClr val="bg1"/>
+                </a:solidFill>
+              </a:rPr>
+            </a:br>
+            <a:r>
+              <a:rPr lang="en-US" sz="2200" dirty="0">
+                <a:solidFill>
+                  <a:schemeClr val="bg1"/>
+                </a:solidFill>
+              </a:rPr>
+              <a:t/>
+            </a:r>
+            <a:br>
+              <a:rPr lang="en-US" sz="2200" dirty="0">
+                <a:solidFill>
+                  <a:schemeClr val="bg1"/>
+                </a:solidFill>
+              </a:rPr>
+            </a:br>
+            <a:r>
+              <a:rPr lang="en-US" sz="2200" dirty="0" smtClean="0">
+                <a:solidFill>
+                  <a:srgbClr val="FF0000"/>
+                </a:solidFill>
+              </a:rPr>
+              <a:t>Homework:</a:t>
+            </a:r>
+            <a:r>
+              <a:rPr lang="en-US" sz="2200" dirty="0" smtClean="0">
+                <a:solidFill>
+                  <a:schemeClr val="bg1"/>
+                </a:solidFill>
+              </a:rPr>
+              <a:t/>
+            </a:r>
+            <a:br>
+              <a:rPr lang="en-US" sz="2200" dirty="0" smtClean="0">
+                <a:solidFill>
+                  <a:schemeClr val="bg1"/>
+                </a:solidFill>
+              </a:rPr>
+            </a:br>
+            <a:r>
+              <a:rPr lang="en-US" sz="2200" dirty="0" smtClean="0">
+                <a:solidFill>
+                  <a:schemeClr val="bg1"/>
+                </a:solidFill>
+              </a:rPr>
+              <a:t>1. Write a script, that takes directory addresses as </a:t>
+            </a:r>
+            <a:r>
+              <a:rPr lang="en-US" sz="2200" dirty="0" err="1" smtClean="0">
+                <a:solidFill>
+                  <a:schemeClr val="bg1"/>
+                </a:solidFill>
+              </a:rPr>
+              <a:t>hist</a:t>
+            </a:r>
+            <a:r>
+              <a:rPr lang="en-US" sz="2200" dirty="0" smtClean="0">
+                <a:solidFill>
+                  <a:schemeClr val="bg1"/>
+                </a:solidFill>
+              </a:rPr>
+              <a:t> first and second argument and checks whether they exist.</a:t>
+            </a:r>
+            <a:br>
+              <a:rPr lang="en-US" sz="2200" dirty="0" smtClean="0">
+                <a:solidFill>
+                  <a:schemeClr val="bg1"/>
+                </a:solidFill>
+              </a:rPr>
+            </a:br>
+            <a:r>
+              <a:rPr lang="en-US" sz="2200" dirty="0" smtClean="0">
+                <a:solidFill>
+                  <a:schemeClr val="bg1"/>
+                </a:solidFill>
+              </a:rPr>
+              <a:t>2. Encapsulate the above in a function.</a:t>
+            </a:r>
+            <a:br>
+              <a:rPr lang="en-US" sz="2200" dirty="0" smtClean="0">
+                <a:solidFill>
+                  <a:schemeClr val="bg1"/>
+                </a:solidFill>
+              </a:rPr>
+            </a:br>
+            <a:r>
+              <a:rPr lang="en-US" sz="2200" dirty="0" smtClean="0">
+                <a:solidFill>
+                  <a:schemeClr val="bg1"/>
+                </a:solidFill>
+              </a:rPr>
+              <a:t>3. Call </a:t>
+            </a:r>
+            <a:r>
+              <a:rPr lang="en-US" sz="2200" smtClean="0">
+                <a:solidFill>
+                  <a:schemeClr val="bg1"/>
+                </a:solidFill>
+              </a:rPr>
+              <a:t>the function.</a:t>
+            </a:r>
+            <a:endParaRPr lang="en-US" sz="2200" dirty="0">
+              <a:solidFill>
+                <a:schemeClr val="bg1"/>
+              </a:solidFill>
+            </a:endParaRPr>
+          </a:p>
+        </p:txBody>
+      </p:sp>
+      <p:sp>
+        <p:nvSpPr>
+          <p:cNvPr id="3" name="Content Placeholder 2"/>
+          <p:cNvSpPr>
+            <a:spLocks noGrp="1"/>
+          </p:cNvSpPr>
+          <p:nvPr>
+            <p:ph idx="1"/>
+          </p:nvPr>
+        </p:nvSpPr>
+        <p:spPr>
+          <a:xfrm>
+            <a:off x="7315200" y="4876800"/>
+            <a:ext cx="1371600" cy="1249363"/>
+          </a:xfrm>
+        </p:spPr>
+        <p:txBody>
+          <a:bodyPr/>
+          <a:lstStyle/>
+          <a:p>
+            <a:endParaRPr lang="en-US" dirty="0"/>
+          </a:p>
+        </p:txBody>
+      </p:sp>
+    </p:spTree>
+    <p:extLst>
+      <p:ext uri="{BB962C8B-B14F-4D97-AF65-F5344CB8AC3E}">
+        <p14:creationId xmlns:p14="http://schemas.microsoft.com/office/powerpoint/2010/main" val="1177478398"/>
       </p:ext>
     </p:extLst>
   </p:cSld>

</xml_diff>